<commit_message>
Valahi billahi son güncelleme
</commit_message>
<xml_diff>
--- a/dahahilipls.pptx
+++ b/dahahilipls.pptx
@@ -5,10 +5,10 @@
     <p:sldMasterId id="2147483648" r:id="rId2"/>
   </p:sldMasterIdLst>
   <p:notesMasterIdLst>
-    <p:notesMasterId r:id="rId27"/>
+    <p:notesMasterId r:id="rId29"/>
   </p:notesMasterIdLst>
   <p:handoutMasterIdLst>
-    <p:handoutMasterId r:id="rId28"/>
+    <p:handoutMasterId r:id="rId30"/>
   </p:handoutMasterIdLst>
   <p:sldIdLst>
     <p:sldId id="256" r:id="rId3"/>
@@ -16,25 +16,27 @@
     <p:sldId id="258" r:id="rId5"/>
     <p:sldId id="259" r:id="rId6"/>
     <p:sldId id="260" r:id="rId7"/>
-    <p:sldId id="261" r:id="rId8"/>
-    <p:sldId id="270" r:id="rId9"/>
-    <p:sldId id="271" r:id="rId10"/>
-    <p:sldId id="272" r:id="rId11"/>
-    <p:sldId id="262" r:id="rId12"/>
-    <p:sldId id="263" r:id="rId13"/>
-    <p:sldId id="274" r:id="rId14"/>
-    <p:sldId id="264" r:id="rId15"/>
-    <p:sldId id="273" r:id="rId16"/>
-    <p:sldId id="265" r:id="rId17"/>
-    <p:sldId id="266" r:id="rId18"/>
-    <p:sldId id="267" r:id="rId19"/>
-    <p:sldId id="268" r:id="rId20"/>
-    <p:sldId id="280" r:id="rId21"/>
-    <p:sldId id="275" r:id="rId22"/>
-    <p:sldId id="277" r:id="rId23"/>
-    <p:sldId id="276" r:id="rId24"/>
-    <p:sldId id="279" r:id="rId25"/>
-    <p:sldId id="278" r:id="rId26"/>
+    <p:sldId id="281" r:id="rId8"/>
+    <p:sldId id="261" r:id="rId9"/>
+    <p:sldId id="270" r:id="rId10"/>
+    <p:sldId id="271" r:id="rId11"/>
+    <p:sldId id="272" r:id="rId12"/>
+    <p:sldId id="262" r:id="rId13"/>
+    <p:sldId id="263" r:id="rId14"/>
+    <p:sldId id="274" r:id="rId15"/>
+    <p:sldId id="264" r:id="rId16"/>
+    <p:sldId id="282" r:id="rId17"/>
+    <p:sldId id="273" r:id="rId18"/>
+    <p:sldId id="265" r:id="rId19"/>
+    <p:sldId id="266" r:id="rId20"/>
+    <p:sldId id="267" r:id="rId21"/>
+    <p:sldId id="268" r:id="rId22"/>
+    <p:sldId id="280" r:id="rId23"/>
+    <p:sldId id="275" r:id="rId24"/>
+    <p:sldId id="277" r:id="rId25"/>
+    <p:sldId id="276" r:id="rId26"/>
+    <p:sldId id="279" r:id="rId27"/>
+    <p:sldId id="278" r:id="rId28"/>
   </p:sldIdLst>
   <p:sldSz cx="12192000" cy="6858000"/>
   <p:notesSz cx="6858000" cy="9144000"/>
@@ -246,7 +248,7 @@
           <a:p>
             <a:fld id="{804136C7-FB4F-4486-A3C2-378AD4BCA59E}" type="datetimeFigureOut">
               <a:rPr lang="tr-TR" smtClean="0"/>
-              <a:t>27.01.2026</a:t>
+              <a:t>28.01.2026</a:t>
             </a:fld>
             <a:endParaRPr lang="tr-TR"/>
           </a:p>
@@ -435,7 +437,7 @@
           <a:p>
             <a:fld id="{03F75F1C-96D1-4385-A770-21325CBD7C70}" type="datetimeFigureOut">
               <a:rPr lang="tr-TR" smtClean="0"/>
-              <a:t>27.01.2026</a:t>
+              <a:t>28.01.2026</a:t>
             </a:fld>
             <a:endParaRPr lang="tr-TR"/>
           </a:p>
@@ -950,7 +952,7 @@
     </p:spTree>
     <p:extLst>
       <p:ext uri="{BB962C8B-B14F-4D97-AF65-F5344CB8AC3E}">
-        <p14:creationId xmlns:p14="http://schemas.microsoft.com/office/powerpoint/2010/main" val="3551584099"/>
+        <p14:creationId xmlns:p14="http://schemas.microsoft.com/office/powerpoint/2010/main" val="4157457556"/>
       </p:ext>
     </p:extLst>
   </p:cSld>
@@ -1078,7 +1080,7 @@
     </p:spTree>
     <p:extLst>
       <p:ext uri="{BB962C8B-B14F-4D97-AF65-F5344CB8AC3E}">
-        <p14:creationId xmlns:p14="http://schemas.microsoft.com/office/powerpoint/2010/main" val="1603975523"/>
+        <p14:creationId xmlns:p14="http://schemas.microsoft.com/office/powerpoint/2010/main" val="3551584099"/>
       </p:ext>
     </p:extLst>
   </p:cSld>
@@ -1206,7 +1208,7 @@
     </p:spTree>
     <p:extLst>
       <p:ext uri="{BB962C8B-B14F-4D97-AF65-F5344CB8AC3E}">
-        <p14:creationId xmlns:p14="http://schemas.microsoft.com/office/powerpoint/2010/main" val="2334987450"/>
+        <p14:creationId xmlns:p14="http://schemas.microsoft.com/office/powerpoint/2010/main" val="1603975523"/>
       </p:ext>
     </p:extLst>
   </p:cSld>
@@ -1334,7 +1336,7 @@
     </p:spTree>
     <p:extLst>
       <p:ext uri="{BB962C8B-B14F-4D97-AF65-F5344CB8AC3E}">
-        <p14:creationId xmlns:p14="http://schemas.microsoft.com/office/powerpoint/2010/main" val="3652783704"/>
+        <p14:creationId xmlns:p14="http://schemas.microsoft.com/office/powerpoint/2010/main" val="2334987450"/>
       </p:ext>
     </p:extLst>
   </p:cSld>
@@ -1462,7 +1464,7 @@
     </p:spTree>
     <p:extLst>
       <p:ext uri="{BB962C8B-B14F-4D97-AF65-F5344CB8AC3E}">
-        <p14:creationId xmlns:p14="http://schemas.microsoft.com/office/powerpoint/2010/main" val="1275393312"/>
+        <p14:creationId xmlns:p14="http://schemas.microsoft.com/office/powerpoint/2010/main" val="3652783704"/>
       </p:ext>
     </p:extLst>
   </p:cSld>
@@ -1590,7 +1592,7 @@
     </p:spTree>
     <p:extLst>
       <p:ext uri="{BB962C8B-B14F-4D97-AF65-F5344CB8AC3E}">
-        <p14:creationId xmlns:p14="http://schemas.microsoft.com/office/powerpoint/2010/main" val="2048345745"/>
+        <p14:creationId xmlns:p14="http://schemas.microsoft.com/office/powerpoint/2010/main" val="2906484092"/>
       </p:ext>
     </p:extLst>
   </p:cSld>
@@ -1718,7 +1720,7 @@
     </p:spTree>
     <p:extLst>
       <p:ext uri="{BB962C8B-B14F-4D97-AF65-F5344CB8AC3E}">
-        <p14:creationId xmlns:p14="http://schemas.microsoft.com/office/powerpoint/2010/main" val="3866334057"/>
+        <p14:creationId xmlns:p14="http://schemas.microsoft.com/office/powerpoint/2010/main" val="1275393312"/>
       </p:ext>
     </p:extLst>
   </p:cSld>
@@ -1846,7 +1848,7 @@
     </p:spTree>
     <p:extLst>
       <p:ext uri="{BB962C8B-B14F-4D97-AF65-F5344CB8AC3E}">
-        <p14:creationId xmlns:p14="http://schemas.microsoft.com/office/powerpoint/2010/main" val="562200285"/>
+        <p14:creationId xmlns:p14="http://schemas.microsoft.com/office/powerpoint/2010/main" val="2048345745"/>
       </p:ext>
     </p:extLst>
   </p:cSld>
@@ -1974,7 +1976,7 @@
     </p:spTree>
     <p:extLst>
       <p:ext uri="{BB962C8B-B14F-4D97-AF65-F5344CB8AC3E}">
-        <p14:creationId xmlns:p14="http://schemas.microsoft.com/office/powerpoint/2010/main" val="3720815415"/>
+        <p14:creationId xmlns:p14="http://schemas.microsoft.com/office/powerpoint/2010/main" val="3866334057"/>
       </p:ext>
     </p:extLst>
   </p:cSld>
@@ -2102,7 +2104,7 @@
     </p:spTree>
     <p:extLst>
       <p:ext uri="{BB962C8B-B14F-4D97-AF65-F5344CB8AC3E}">
-        <p14:creationId xmlns:p14="http://schemas.microsoft.com/office/powerpoint/2010/main" val="1694914794"/>
+        <p14:creationId xmlns:p14="http://schemas.microsoft.com/office/powerpoint/2010/main" val="562200285"/>
       </p:ext>
     </p:extLst>
   </p:cSld>
@@ -2358,7 +2360,7 @@
     </p:spTree>
     <p:extLst>
       <p:ext uri="{BB962C8B-B14F-4D97-AF65-F5344CB8AC3E}">
-        <p14:creationId xmlns:p14="http://schemas.microsoft.com/office/powerpoint/2010/main" val="1036198225"/>
+        <p14:creationId xmlns:p14="http://schemas.microsoft.com/office/powerpoint/2010/main" val="3720815415"/>
       </p:ext>
     </p:extLst>
   </p:cSld>
@@ -2486,7 +2488,7 @@
     </p:spTree>
     <p:extLst>
       <p:ext uri="{BB962C8B-B14F-4D97-AF65-F5344CB8AC3E}">
-        <p14:creationId xmlns:p14="http://schemas.microsoft.com/office/powerpoint/2010/main" val="3004222576"/>
+        <p14:creationId xmlns:p14="http://schemas.microsoft.com/office/powerpoint/2010/main" val="1694914794"/>
       </p:ext>
     </p:extLst>
   </p:cSld>
@@ -2614,7 +2616,7 @@
     </p:spTree>
     <p:extLst>
       <p:ext uri="{BB962C8B-B14F-4D97-AF65-F5344CB8AC3E}">
-        <p14:creationId xmlns:p14="http://schemas.microsoft.com/office/powerpoint/2010/main" val="2263818804"/>
+        <p14:creationId xmlns:p14="http://schemas.microsoft.com/office/powerpoint/2010/main" val="1036198225"/>
       </p:ext>
     </p:extLst>
   </p:cSld>
@@ -2742,7 +2744,7 @@
     </p:spTree>
     <p:extLst>
       <p:ext uri="{BB962C8B-B14F-4D97-AF65-F5344CB8AC3E}">
-        <p14:creationId xmlns:p14="http://schemas.microsoft.com/office/powerpoint/2010/main" val="3447122955"/>
+        <p14:creationId xmlns:p14="http://schemas.microsoft.com/office/powerpoint/2010/main" val="3004222576"/>
       </p:ext>
     </p:extLst>
   </p:cSld>
@@ -2862,6 +2864,262 @@
             <a:fld id="{B0C8BBDD-C3B0-48D3-84B8-B335C26FBCD7}" type="slidenum">
               <a:rPr lang="tr-TR" smtClean="0"/>
               <a:t>24</a:t>
+            </a:fld>
+            <a:endParaRPr lang="tr-TR"/>
+          </a:p>
+        </p:txBody>
+      </p:sp>
+    </p:spTree>
+    <p:extLst>
+      <p:ext uri="{BB962C8B-B14F-4D97-AF65-F5344CB8AC3E}">
+        <p14:creationId xmlns:p14="http://schemas.microsoft.com/office/powerpoint/2010/main" val="2263818804"/>
+      </p:ext>
+    </p:extLst>
+  </p:cSld>
+  <p:clrMapOvr>
+    <a:masterClrMapping/>
+  </p:clrMapOvr>
+</p:notes>
+</file>
+
+<file path=ppt/notesSlides/notesSlide25.xml><?xml version="1.0" encoding="utf-8"?>
+<p:notes xmlns:a="http://schemas.openxmlformats.org/drawingml/2006/main" xmlns:r="http://schemas.openxmlformats.org/officeDocument/2006/relationships" xmlns:p="http://schemas.openxmlformats.org/presentationml/2006/main">
+  <p:cSld>
+    <p:spTree>
+      <p:nvGrpSpPr>
+        <p:cNvPr id="1" name=""/>
+        <p:cNvGrpSpPr/>
+        <p:nvPr/>
+      </p:nvGrpSpPr>
+      <p:grpSpPr>
+        <a:xfrm>
+          <a:off x="0" y="0"/>
+          <a:ext cx="0" cy="0"/>
+          <a:chOff x="0" y="0"/>
+          <a:chExt cx="0" cy="0"/>
+        </a:xfrm>
+      </p:grpSpPr>
+      <p:sp>
+        <p:nvSpPr>
+          <p:cNvPr id="2" name="Slide Image Placeholder 1"/>
+          <p:cNvSpPr>
+            <a:spLocks noGrp="1" noRot="1" noChangeAspect="1"/>
+          </p:cNvSpPr>
+          <p:nvPr>
+            <p:ph type="sldImg"/>
+          </p:nvPr>
+        </p:nvSpPr>
+        <p:spPr/>
+      </p:sp>
+      <p:sp>
+        <p:nvSpPr>
+          <p:cNvPr id="3" name="Notes Placeholder 2"/>
+          <p:cNvSpPr>
+            <a:spLocks noGrp="1"/>
+          </p:cNvSpPr>
+          <p:nvPr>
+            <p:ph type="body" idx="1"/>
+          </p:nvPr>
+        </p:nvSpPr>
+        <p:spPr/>
+        <p:txBody>
+          <a:bodyPr/>
+          <a:lstStyle/>
+          <a:p>
+            <a:endParaRPr lang="tr-TR"/>
+          </a:p>
+        </p:txBody>
+      </p:sp>
+      <p:sp>
+        <p:nvSpPr>
+          <p:cNvPr id="4" name="Header Placeholder 3"/>
+          <p:cNvSpPr>
+            <a:spLocks noGrp="1"/>
+          </p:cNvSpPr>
+          <p:nvPr>
+            <p:ph type="hdr" sz="quarter"/>
+            <p:custDataLst>
+              <p:tags r:id="rId1"/>
+            </p:custDataLst>
+          </p:nvPr>
+        </p:nvSpPr>
+        <p:spPr/>
+        <p:txBody>
+          <a:bodyPr/>
+          <a:lstStyle/>
+          <a:p>
+            <a:r>
+              <a:rPr lang="tr-TR"/>
+              <a:t>TASNİF DIŞI</a:t>
+            </a:r>
+          </a:p>
+        </p:txBody>
+      </p:sp>
+      <p:sp>
+        <p:nvSpPr>
+          <p:cNvPr id="5" name="Footer Placeholder 4"/>
+          <p:cNvSpPr>
+            <a:spLocks noGrp="1"/>
+          </p:cNvSpPr>
+          <p:nvPr>
+            <p:ph type="ftr" sz="quarter" idx="4"/>
+          </p:nvPr>
+        </p:nvSpPr>
+        <p:spPr/>
+        <p:txBody>
+          <a:bodyPr/>
+          <a:lstStyle/>
+          <a:p>
+            <a:endParaRPr lang="tr-TR"/>
+          </a:p>
+        </p:txBody>
+      </p:sp>
+      <p:sp>
+        <p:nvSpPr>
+          <p:cNvPr id="6" name="Slide Number Placeholder 5"/>
+          <p:cNvSpPr>
+            <a:spLocks noGrp="1"/>
+          </p:cNvSpPr>
+          <p:nvPr>
+            <p:ph type="sldNum" sz="quarter" idx="5"/>
+          </p:nvPr>
+        </p:nvSpPr>
+        <p:spPr/>
+        <p:txBody>
+          <a:bodyPr/>
+          <a:lstStyle/>
+          <a:p>
+            <a:fld id="{B0C8BBDD-C3B0-48D3-84B8-B335C26FBCD7}" type="slidenum">
+              <a:rPr lang="tr-TR" smtClean="0"/>
+              <a:t>25</a:t>
+            </a:fld>
+            <a:endParaRPr lang="tr-TR"/>
+          </a:p>
+        </p:txBody>
+      </p:sp>
+    </p:spTree>
+    <p:extLst>
+      <p:ext uri="{BB962C8B-B14F-4D97-AF65-F5344CB8AC3E}">
+        <p14:creationId xmlns:p14="http://schemas.microsoft.com/office/powerpoint/2010/main" val="3447122955"/>
+      </p:ext>
+    </p:extLst>
+  </p:cSld>
+  <p:clrMapOvr>
+    <a:masterClrMapping/>
+  </p:clrMapOvr>
+</p:notes>
+</file>
+
+<file path=ppt/notesSlides/notesSlide26.xml><?xml version="1.0" encoding="utf-8"?>
+<p:notes xmlns:a="http://schemas.openxmlformats.org/drawingml/2006/main" xmlns:r="http://schemas.openxmlformats.org/officeDocument/2006/relationships" xmlns:p="http://schemas.openxmlformats.org/presentationml/2006/main">
+  <p:cSld>
+    <p:spTree>
+      <p:nvGrpSpPr>
+        <p:cNvPr id="1" name=""/>
+        <p:cNvGrpSpPr/>
+        <p:nvPr/>
+      </p:nvGrpSpPr>
+      <p:grpSpPr>
+        <a:xfrm>
+          <a:off x="0" y="0"/>
+          <a:ext cx="0" cy="0"/>
+          <a:chOff x="0" y="0"/>
+          <a:chExt cx="0" cy="0"/>
+        </a:xfrm>
+      </p:grpSpPr>
+      <p:sp>
+        <p:nvSpPr>
+          <p:cNvPr id="2" name="Slide Image Placeholder 1"/>
+          <p:cNvSpPr>
+            <a:spLocks noGrp="1" noRot="1" noChangeAspect="1"/>
+          </p:cNvSpPr>
+          <p:nvPr>
+            <p:ph type="sldImg"/>
+          </p:nvPr>
+        </p:nvSpPr>
+        <p:spPr/>
+      </p:sp>
+      <p:sp>
+        <p:nvSpPr>
+          <p:cNvPr id="3" name="Notes Placeholder 2"/>
+          <p:cNvSpPr>
+            <a:spLocks noGrp="1"/>
+          </p:cNvSpPr>
+          <p:nvPr>
+            <p:ph type="body" idx="1"/>
+          </p:nvPr>
+        </p:nvSpPr>
+        <p:spPr/>
+        <p:txBody>
+          <a:bodyPr/>
+          <a:lstStyle/>
+          <a:p>
+            <a:endParaRPr lang="tr-TR"/>
+          </a:p>
+        </p:txBody>
+      </p:sp>
+      <p:sp>
+        <p:nvSpPr>
+          <p:cNvPr id="4" name="Header Placeholder 3"/>
+          <p:cNvSpPr>
+            <a:spLocks noGrp="1"/>
+          </p:cNvSpPr>
+          <p:nvPr>
+            <p:ph type="hdr" sz="quarter"/>
+            <p:custDataLst>
+              <p:tags r:id="rId1"/>
+            </p:custDataLst>
+          </p:nvPr>
+        </p:nvSpPr>
+        <p:spPr/>
+        <p:txBody>
+          <a:bodyPr/>
+          <a:lstStyle/>
+          <a:p>
+            <a:r>
+              <a:rPr lang="tr-TR"/>
+              <a:t>TASNİF DIŞI</a:t>
+            </a:r>
+          </a:p>
+        </p:txBody>
+      </p:sp>
+      <p:sp>
+        <p:nvSpPr>
+          <p:cNvPr id="5" name="Footer Placeholder 4"/>
+          <p:cNvSpPr>
+            <a:spLocks noGrp="1"/>
+          </p:cNvSpPr>
+          <p:nvPr>
+            <p:ph type="ftr" sz="quarter" idx="4"/>
+          </p:nvPr>
+        </p:nvSpPr>
+        <p:spPr/>
+        <p:txBody>
+          <a:bodyPr/>
+          <a:lstStyle/>
+          <a:p>
+            <a:endParaRPr lang="tr-TR"/>
+          </a:p>
+        </p:txBody>
+      </p:sp>
+      <p:sp>
+        <p:nvSpPr>
+          <p:cNvPr id="6" name="Slide Number Placeholder 5"/>
+          <p:cNvSpPr>
+            <a:spLocks noGrp="1"/>
+          </p:cNvSpPr>
+          <p:nvPr>
+            <p:ph type="sldNum" sz="quarter" idx="5"/>
+          </p:nvPr>
+        </p:nvSpPr>
+        <p:spPr/>
+        <p:txBody>
+          <a:bodyPr/>
+          <a:lstStyle/>
+          <a:p>
+            <a:fld id="{B0C8BBDD-C3B0-48D3-84B8-B335C26FBCD7}" type="slidenum">
+              <a:rPr lang="tr-TR" smtClean="0"/>
+              <a:t>26</a:t>
             </a:fld>
             <a:endParaRPr lang="tr-TR"/>
           </a:p>
@@ -3382,7 +3640,7 @@
     </p:spTree>
     <p:extLst>
       <p:ext uri="{BB962C8B-B14F-4D97-AF65-F5344CB8AC3E}">
-        <p14:creationId xmlns:p14="http://schemas.microsoft.com/office/powerpoint/2010/main" val="1569182570"/>
+        <p14:creationId xmlns:p14="http://schemas.microsoft.com/office/powerpoint/2010/main" val="4252581829"/>
       </p:ext>
     </p:extLst>
   </p:cSld>
@@ -3510,7 +3768,7 @@
     </p:spTree>
     <p:extLst>
       <p:ext uri="{BB962C8B-B14F-4D97-AF65-F5344CB8AC3E}">
-        <p14:creationId xmlns:p14="http://schemas.microsoft.com/office/powerpoint/2010/main" val="525669861"/>
+        <p14:creationId xmlns:p14="http://schemas.microsoft.com/office/powerpoint/2010/main" val="1569182570"/>
       </p:ext>
     </p:extLst>
   </p:cSld>
@@ -3638,7 +3896,7 @@
     </p:spTree>
     <p:extLst>
       <p:ext uri="{BB962C8B-B14F-4D97-AF65-F5344CB8AC3E}">
-        <p14:creationId xmlns:p14="http://schemas.microsoft.com/office/powerpoint/2010/main" val="2313114444"/>
+        <p14:creationId xmlns:p14="http://schemas.microsoft.com/office/powerpoint/2010/main" val="525669861"/>
       </p:ext>
     </p:extLst>
   </p:cSld>
@@ -3766,7 +4024,7 @@
     </p:spTree>
     <p:extLst>
       <p:ext uri="{BB962C8B-B14F-4D97-AF65-F5344CB8AC3E}">
-        <p14:creationId xmlns:p14="http://schemas.microsoft.com/office/powerpoint/2010/main" val="4157457556"/>
+        <p14:creationId xmlns:p14="http://schemas.microsoft.com/office/powerpoint/2010/main" val="2313114444"/>
       </p:ext>
     </p:extLst>
   </p:cSld>
@@ -3925,7 +4183,7 @@
           <a:p>
             <a:fld id="{4BB3D0F9-C69A-4DAD-9822-657E93D18B16}" type="datetime1">
               <a:rPr lang="tr-TR" smtClean="0"/>
-              <a:t>27.01.2026</a:t>
+              <a:t>28.01.2026</a:t>
             </a:fld>
             <a:endParaRPr lang="tr-TR"/>
           </a:p>
@@ -4125,7 +4383,7 @@
           <a:p>
             <a:fld id="{162B5E83-06BF-48D1-904C-45BD28A543C2}" type="datetime1">
               <a:rPr lang="tr-TR" smtClean="0"/>
-              <a:t>27.01.2026</a:t>
+              <a:t>28.01.2026</a:t>
             </a:fld>
             <a:endParaRPr lang="tr-TR"/>
           </a:p>
@@ -4335,7 +4593,7 @@
           <a:p>
             <a:fld id="{2CF74FCA-AEC8-4A10-A5F6-696D850CFB62}" type="datetime1">
               <a:rPr lang="tr-TR" smtClean="0"/>
-              <a:t>27.01.2026</a:t>
+              <a:t>28.01.2026</a:t>
             </a:fld>
             <a:endParaRPr lang="tr-TR"/>
           </a:p>
@@ -4535,7 +4793,7 @@
           <a:p>
             <a:fld id="{B86EC6C7-06AD-4535-B763-96EA61EE6375}" type="datetime1">
               <a:rPr lang="tr-TR" smtClean="0"/>
-              <a:t>27.01.2026</a:t>
+              <a:t>28.01.2026</a:t>
             </a:fld>
             <a:endParaRPr lang="tr-TR"/>
           </a:p>
@@ -4773,7 +5031,7 @@
           <a:p>
             <a:fld id="{D1FDD170-2B24-4EF2-839B-95523F088740}" type="datetime1">
               <a:rPr lang="tr-TR" smtClean="0"/>
-              <a:t>27.01.2026</a:t>
+              <a:t>28.01.2026</a:t>
             </a:fld>
             <a:endParaRPr lang="tr-TR"/>
           </a:p>
@@ -5070,7 +5328,7 @@
           <a:p>
             <a:fld id="{FE9EF3D2-F7D3-4F4A-96EA-9F225C6F3DBC}" type="datetime1">
               <a:rPr lang="tr-TR" smtClean="0"/>
-              <a:t>27.01.2026</a:t>
+              <a:t>28.01.2026</a:t>
             </a:fld>
             <a:endParaRPr lang="tr-TR"/>
           </a:p>
@@ -5485,7 +5743,7 @@
           <a:p>
             <a:fld id="{58DF2CEC-19D4-4CDA-BD34-0453D04BC91F}" type="datetime1">
               <a:rPr lang="tr-TR" smtClean="0"/>
-              <a:t>27.01.2026</a:t>
+              <a:t>28.01.2026</a:t>
             </a:fld>
             <a:endParaRPr lang="tr-TR"/>
           </a:p>
@@ -5627,7 +5885,7 @@
           <a:p>
             <a:fld id="{56D95682-C3D2-47D8-9ABB-ED9C7D68DF14}" type="datetime1">
               <a:rPr lang="tr-TR" smtClean="0"/>
-              <a:t>27.01.2026</a:t>
+              <a:t>28.01.2026</a:t>
             </a:fld>
             <a:endParaRPr lang="tr-TR"/>
           </a:p>
@@ -5740,7 +5998,7 @@
           <a:p>
             <a:fld id="{6CB6BDAB-0756-491D-9DEA-75AA95454EA5}" type="datetime1">
               <a:rPr lang="tr-TR" smtClean="0"/>
-              <a:t>27.01.2026</a:t>
+              <a:t>28.01.2026</a:t>
             </a:fld>
             <a:endParaRPr lang="tr-TR"/>
           </a:p>
@@ -6053,7 +6311,7 @@
           <a:p>
             <a:fld id="{399D6040-17A8-4314-BB6D-05727CFD3CBF}" type="datetime1">
               <a:rPr lang="tr-TR" smtClean="0"/>
-              <a:t>27.01.2026</a:t>
+              <a:t>28.01.2026</a:t>
             </a:fld>
             <a:endParaRPr lang="tr-TR"/>
           </a:p>
@@ -6342,7 +6600,7 @@
           <a:p>
             <a:fld id="{6B052022-39F4-48AA-B984-FE3C96790416}" type="datetime1">
               <a:rPr lang="tr-TR" smtClean="0"/>
-              <a:t>27.01.2026</a:t>
+              <a:t>28.01.2026</a:t>
             </a:fld>
             <a:endParaRPr lang="tr-TR"/>
           </a:p>
@@ -6585,7 +6843,7 @@
           <a:p>
             <a:fld id="{0666F17C-CD24-48C6-B336-87BD176625D7}" type="datetime1">
               <a:rPr lang="tr-TR" smtClean="0"/>
-              <a:t>27.01.2026</a:t>
+              <a:t>28.01.2026</a:t>
             </a:fld>
             <a:endParaRPr lang="tr-TR"/>
           </a:p>
@@ -7288,7 +7546,7 @@
           <p:cNvPr id="2" name="Title 1">
             <a:extLst>
               <a:ext uri="{FF2B5EF4-FFF2-40B4-BE49-F238E27FC236}">
-                <a16:creationId xmlns:a16="http://schemas.microsoft.com/office/drawing/2014/main" id="{A83DED9F-D594-48E7-BBAD-290BE8B2D487}"/>
+                <a16:creationId xmlns:a16="http://schemas.microsoft.com/office/drawing/2014/main" id="{9AAFC9F0-A61F-45D3-A9A1-EEBCCC05DC35}"/>
               </a:ext>
             </a:extLst>
           </p:cNvPr>
@@ -7312,237 +7570,224 @@
           </a:p>
         </p:txBody>
       </p:sp>
-      <p:sp>
-        <p:nvSpPr>
-          <p:cNvPr id="3" name="Content Placeholder 2">
-            <a:extLst>
-              <a:ext uri="{FF2B5EF4-FFF2-40B4-BE49-F238E27FC236}">
-                <a16:creationId xmlns:a16="http://schemas.microsoft.com/office/drawing/2014/main" id="{1C5E9715-7B23-4555-96A9-B6FA7963A73C}"/>
-              </a:ext>
-            </a:extLst>
-          </p:cNvPr>
-          <p:cNvSpPr>
-            <a:spLocks noGrp="1"/>
-          </p:cNvSpPr>
-          <p:nvPr>
-            <p:ph idx="1"/>
-          </p:nvPr>
-        </p:nvSpPr>
-        <p:spPr>
-          <a:xfrm>
-            <a:off x="838200" y="1825625"/>
-            <a:ext cx="10515600" cy="4351338"/>
-          </a:xfrm>
-        </p:spPr>
-        <p:txBody>
-          <a:bodyPr/>
-          <a:lstStyle/>
-          <a:p>
-            <a:r>
-              <a:rPr lang="en-US" dirty="0"/>
-              <a:t>Low-Level: any optimal single agent pathfinding algorithm which can satisfies all the constraint such as A*, can be used</a:t>
-            </a:r>
-            <a:endParaRPr lang="tr-TR" dirty="0"/>
-          </a:p>
-        </p:txBody>
-      </p:sp>
-      <p:pic>
-        <p:nvPicPr>
-          <p:cNvPr id="4" name="Picture 3">
-            <a:extLst>
-              <a:ext uri="{FF2B5EF4-FFF2-40B4-BE49-F238E27FC236}">
-                <a16:creationId xmlns:a16="http://schemas.microsoft.com/office/drawing/2014/main" id="{E7BA8906-E22E-4338-9FB7-0E36DEB25B72}"/>
-              </a:ext>
-            </a:extLst>
-          </p:cNvPr>
-          <p:cNvPicPr>
-            <a:picLocks noChangeAspect="1"/>
-          </p:cNvPicPr>
-          <p:nvPr/>
-        </p:nvPicPr>
-        <p:blipFill>
-          <a:blip r:embed="rId3"/>
-          <a:stretch>
-            <a:fillRect/>
-          </a:stretch>
-        </p:blipFill>
-        <p:spPr>
-          <a:xfrm>
-            <a:off x="6182989" y="2619484"/>
-            <a:ext cx="3626565" cy="2763617"/>
-          </a:xfrm>
-          <a:prstGeom prst="rect">
-            <a:avLst/>
-          </a:prstGeom>
-        </p:spPr>
-      </p:pic>
-      <p:pic>
-        <p:nvPicPr>
-          <p:cNvPr id="5" name="Picture 4">
-            <a:extLst>
-              <a:ext uri="{FF2B5EF4-FFF2-40B4-BE49-F238E27FC236}">
-                <a16:creationId xmlns:a16="http://schemas.microsoft.com/office/drawing/2014/main" id="{7EB7CB65-31D8-4F21-B9C1-2EE0F179A48A}"/>
-              </a:ext>
-            </a:extLst>
-          </p:cNvPr>
-          <p:cNvPicPr>
-            <a:picLocks noChangeAspect="1"/>
-          </p:cNvPicPr>
-          <p:nvPr/>
-        </p:nvPicPr>
-        <p:blipFill>
-          <a:blip r:embed="rId4"/>
-          <a:stretch>
-            <a:fillRect/>
-          </a:stretch>
-        </p:blipFill>
-        <p:spPr>
-          <a:xfrm>
-            <a:off x="1486832" y="2754239"/>
-            <a:ext cx="2555239" cy="2494109"/>
-          </a:xfrm>
-          <a:prstGeom prst="rect">
-            <a:avLst/>
-          </a:prstGeom>
-        </p:spPr>
-      </p:pic>
-      <mc:AlternateContent xmlns:mc="http://schemas.openxmlformats.org/markup-compatibility/2006" xmlns:a14="http://schemas.microsoft.com/office/drawing/2010/main">
-        <mc:Choice Requires="a14">
+      <mc:AlternateContent xmlns:mc="http://schemas.openxmlformats.org/markup-compatibility/2006">
+        <mc:Choice xmlns:a14="http://schemas.microsoft.com/office/drawing/2010/main" Requires="a14">
           <p:sp>
             <p:nvSpPr>
-              <p:cNvPr id="6" name="TextBox 5">
+              <p:cNvPr id="3" name="Content Placeholder 2">
                 <a:extLst>
                   <a:ext uri="{FF2B5EF4-FFF2-40B4-BE49-F238E27FC236}">
-                    <a16:creationId xmlns:a16="http://schemas.microsoft.com/office/drawing/2014/main" id="{259FE677-9AAC-41E7-9D26-F086CF4109E3}"/>
+                    <a16:creationId xmlns:a16="http://schemas.microsoft.com/office/drawing/2014/main" id="{D54AD1DD-94E1-4010-805C-B6DD763D30CF}"/>
                   </a:ext>
                 </a:extLst>
               </p:cNvPr>
-              <p:cNvSpPr txBox="1"/>
-              <p:nvPr/>
+              <p:cNvSpPr>
+                <a:spLocks noGrp="1"/>
+              </p:cNvSpPr>
+              <p:nvPr>
+                <p:ph idx="1"/>
+              </p:nvPr>
             </p:nvSpPr>
-            <p:spPr>
-              <a:xfrm>
-                <a:off x="2011680" y="5595366"/>
-                <a:ext cx="6619504" cy="369332"/>
-              </a:xfrm>
-              <a:prstGeom prst="rect">
-                <a:avLst/>
-              </a:prstGeom>
-              <a:noFill/>
-            </p:spPr>
+            <p:spPr/>
             <p:txBody>
-              <a:bodyPr wrap="none" rtlCol="0">
-                <a:spAutoFit/>
-              </a:bodyPr>
+              <a:bodyPr/>
               <a:lstStyle/>
               <a:p>
                 <a:r>
                   <a:rPr lang="en-US" dirty="0"/>
-                  <a:t>A* will expand </a:t>
+                  <a:t>Edge conflict:</a:t>
                 </a:r>
+              </a:p>
+              <a:p>
                 <a14:m>
                   <m:oMath xmlns:m="http://schemas.openxmlformats.org/officeDocument/2006/math">
-                    <m:sSup>
-                      <m:sSupPr>
+                    <m:r>
+                      <a:rPr lang="en-US" sz="2000" i="1">
+                        <a:latin typeface="Cambria Math" panose="02040503050406030204" pitchFamily="18" charset="0"/>
+                      </a:rPr>
+                      <m:t>(</m:t>
+                    </m:r>
+                    <m:sSub>
+                      <m:sSubPr>
                         <m:ctrlPr>
-                          <a:rPr lang="en-US" b="0" i="1" smtClean="0">
+                          <a:rPr lang="en-US" sz="2000" b="0" i="1" smtClean="0">
                             <a:latin typeface="Cambria Math" panose="02040503050406030204" pitchFamily="18" charset="0"/>
                           </a:rPr>
                         </m:ctrlPr>
-                      </m:sSupPr>
+                      </m:sSubPr>
                       <m:e>
                         <m:r>
-                          <a:rPr lang="en-US" b="0" i="1" smtClean="0">
+                          <a:rPr lang="en-US" sz="2000" b="0" i="1" smtClean="0">
                             <a:latin typeface="Cambria Math" panose="02040503050406030204" pitchFamily="18" charset="0"/>
                           </a:rPr>
-                          <m:t>𝑚</m:t>
+                          <m:t>𝑎</m:t>
                         </m:r>
                       </m:e>
-                      <m:sup>
+                      <m:sub>
                         <m:r>
-                          <a:rPr lang="en-US" b="0" i="1" smtClean="0">
+                          <a:rPr lang="en-US" sz="2000" b="0" i="1" smtClean="0">
+                            <a:latin typeface="Cambria Math" panose="02040503050406030204" pitchFamily="18" charset="0"/>
+                          </a:rPr>
+                          <m:t>𝑖</m:t>
+                        </m:r>
+                      </m:sub>
+                    </m:sSub>
+                    <m:r>
+                      <a:rPr lang="en-US" sz="2000" i="1">
+                        <a:latin typeface="Cambria Math" panose="02040503050406030204" pitchFamily="18" charset="0"/>
+                      </a:rPr>
+                      <m:t>,</m:t>
+                    </m:r>
+                    <m:sSub>
+                      <m:sSubPr>
+                        <m:ctrlPr>
+                          <a:rPr lang="en-US" sz="2000" b="0" i="1" smtClean="0">
+                            <a:latin typeface="Cambria Math" panose="02040503050406030204" pitchFamily="18" charset="0"/>
+                          </a:rPr>
+                        </m:ctrlPr>
+                      </m:sSubPr>
+                      <m:e>
+                        <m:r>
+                          <a:rPr lang="en-US" sz="2000" b="0" i="1" smtClean="0">
+                            <a:latin typeface="Cambria Math" panose="02040503050406030204" pitchFamily="18" charset="0"/>
+                          </a:rPr>
+                          <m:t>𝑎</m:t>
+                        </m:r>
+                      </m:e>
+                      <m:sub>
+                        <m:r>
+                          <a:rPr lang="en-US" sz="2000" b="0" i="1" smtClean="0">
+                            <a:latin typeface="Cambria Math" panose="02040503050406030204" pitchFamily="18" charset="0"/>
+                          </a:rPr>
+                          <m:t>𝑗</m:t>
+                        </m:r>
+                      </m:sub>
+                    </m:sSub>
+                    <m:r>
+                      <a:rPr lang="en-US" sz="2000" b="0" i="1" smtClean="0">
+                        <a:latin typeface="Cambria Math" panose="02040503050406030204" pitchFamily="18" charset="0"/>
+                      </a:rPr>
+                      <m:t>,</m:t>
+                    </m:r>
+                    <m:sSub>
+                      <m:sSubPr>
+                        <m:ctrlPr>
+                          <a:rPr lang="en-US" sz="2000" i="1">
+                            <a:latin typeface="Cambria Math" panose="02040503050406030204" pitchFamily="18" charset="0"/>
+                          </a:rPr>
+                        </m:ctrlPr>
+                      </m:sSubPr>
+                      <m:e>
+                        <m:r>
+                          <a:rPr lang="en-US" sz="2000" i="1">
+                            <a:latin typeface="Cambria Math" panose="02040503050406030204" pitchFamily="18" charset="0"/>
+                          </a:rPr>
+                          <m:t>𝑣</m:t>
+                        </m:r>
+                      </m:e>
+                      <m:sub>
+                        <m:r>
+                          <a:rPr lang="en-US" sz="2000" b="0" i="1" smtClean="0">
+                            <a:latin typeface="Cambria Math" panose="02040503050406030204" pitchFamily="18" charset="0"/>
+                          </a:rPr>
+                          <m:t>1</m:t>
+                        </m:r>
+                      </m:sub>
+                    </m:sSub>
+                    <m:r>
+                      <a:rPr lang="en-US" sz="2000" i="1">
+                        <a:latin typeface="Cambria Math" panose="02040503050406030204" pitchFamily="18" charset="0"/>
+                      </a:rPr>
+                      <m:t>, </m:t>
+                    </m:r>
+                    <m:sSub>
+                      <m:sSubPr>
+                        <m:ctrlPr>
+                          <a:rPr lang="en-US" sz="2000" i="1">
+                            <a:latin typeface="Cambria Math" panose="02040503050406030204" pitchFamily="18" charset="0"/>
+                          </a:rPr>
+                        </m:ctrlPr>
+                      </m:sSubPr>
+                      <m:e>
+                        <m:r>
+                          <a:rPr lang="en-US" sz="2000" i="1">
+                            <a:latin typeface="Cambria Math" panose="02040503050406030204" pitchFamily="18" charset="0"/>
+                          </a:rPr>
+                          <m:t>𝑣</m:t>
+                        </m:r>
+                      </m:e>
+                      <m:sub>
+                        <m:r>
+                          <a:rPr lang="en-US" sz="2000" i="1">
                             <a:latin typeface="Cambria Math" panose="02040503050406030204" pitchFamily="18" charset="0"/>
                           </a:rPr>
                           <m:t>2</m:t>
                         </m:r>
-                      </m:sup>
-                    </m:sSup>
+                      </m:sub>
+                    </m:sSub>
                     <m:r>
-                      <a:rPr lang="en-US" b="0" i="1" smtClean="0">
+                      <a:rPr lang="en-US" sz="2000" i="1">
                         <a:latin typeface="Cambria Math" panose="02040503050406030204" pitchFamily="18" charset="0"/>
                       </a:rPr>
-                      <m:t>+3 </m:t>
+                      <m:t>,</m:t>
                     </m:r>
                     <m:r>
-                      <a:rPr lang="en-US" b="0" i="1" smtClean="0">
+                      <a:rPr lang="en-US" sz="2000" b="0" i="1" smtClean="0">
                         <a:latin typeface="Cambria Math" panose="02040503050406030204" pitchFamily="18" charset="0"/>
                       </a:rPr>
-                      <m:t>𝑛𝑜𝑑𝑒</m:t>
+                      <m:t>𝑡</m:t>
+                    </m:r>
+                    <m:r>
+                      <a:rPr lang="en-US" sz="2000" i="1">
+                        <a:latin typeface="Cambria Math" panose="02040503050406030204" pitchFamily="18" charset="0"/>
+                      </a:rPr>
+                      <m:t>)</m:t>
                     </m:r>
                   </m:oMath>
                 </a14:m>
+                <a:endParaRPr lang="en-US" sz="2000" dirty="0"/>
+              </a:p>
+              <a:p>
+                <a:endParaRPr lang="en-US" dirty="0"/>
+              </a:p>
+              <a:p>
+                <a:endParaRPr lang="en-US" dirty="0"/>
+              </a:p>
+              <a:p>
+                <a:pPr marL="3200400" lvl="7" indent="0">
+                  <a:buNone/>
+                </a:pPr>
                 <a:r>
                   <a:rPr lang="en-US" dirty="0"/>
-                  <a:t> while CBS only </a:t>
-                </a:r>
-                <a14:m>
-                  <m:oMath xmlns:m="http://schemas.openxmlformats.org/officeDocument/2006/math">
-                    <m:r>
-                      <a:rPr lang="en-US" i="1" dirty="0" smtClean="0">
-                        <a:latin typeface="Cambria Math" panose="02040503050406030204" pitchFamily="18" charset="0"/>
-                      </a:rPr>
-                      <m:t>2</m:t>
-                    </m:r>
-                    <m:r>
-                      <a:rPr lang="en-US" i="1" dirty="0" smtClean="0">
-                        <a:latin typeface="Cambria Math" panose="02040503050406030204" pitchFamily="18" charset="0"/>
-                      </a:rPr>
-                      <m:t>𝑚</m:t>
-                    </m:r>
-                    <m:r>
-                      <a:rPr lang="en-US" i="1" dirty="0" smtClean="0">
-                        <a:latin typeface="Cambria Math" panose="02040503050406030204" pitchFamily="18" charset="0"/>
-                      </a:rPr>
-                      <m:t>+14</m:t>
-                    </m:r>
-                  </m:oMath>
-                </a14:m>
-                <a:r>
-                  <a:rPr lang="en-US" dirty="0"/>
-                  <a:t> low level node</a:t>
+                  <a:t>			 </a:t>
                 </a:r>
                 <a:endParaRPr lang="tr-TR" dirty="0"/>
               </a:p>
             </p:txBody>
           </p:sp>
         </mc:Choice>
-        <mc:Fallback xmlns="">
+        <mc:Fallback>
           <p:sp>
             <p:nvSpPr>
-              <p:cNvPr id="6" name="TextBox 5">
+              <p:cNvPr id="3" name="Content Placeholder 2">
                 <a:extLst>
                   <a:ext uri="{FF2B5EF4-FFF2-40B4-BE49-F238E27FC236}">
-                    <a16:creationId xmlns:a16="http://schemas.microsoft.com/office/drawing/2014/main" id="{259FE677-9AAC-41E7-9D26-F086CF4109E3}"/>
+                    <a16:creationId xmlns:a16="http://schemas.microsoft.com/office/drawing/2014/main" id="{D54AD1DD-94E1-4010-805C-B6DD763D30CF}"/>
                   </a:ext>
                 </a:extLst>
               </p:cNvPr>
-              <p:cNvSpPr txBox="1">
-                <a:spLocks noRot="1" noChangeAspect="1" noMove="1" noResize="1" noEditPoints="1" noAdjustHandles="1" noChangeArrowheads="1" noChangeShapeType="1" noTextEdit="1"/>
+              <p:cNvSpPr>
+                <a:spLocks noGrp="1" noRot="1" noChangeAspect="1" noMove="1" noResize="1" noEditPoints="1" noAdjustHandles="1" noChangeArrowheads="1" noChangeShapeType="1" noTextEdit="1"/>
               </p:cNvSpPr>
-              <p:nvPr/>
+              <p:nvPr>
+                <p:ph idx="1"/>
+              </p:nvPr>
             </p:nvSpPr>
             <p:spPr>
-              <a:xfrm>
-                <a:off x="2011680" y="5595366"/>
-                <a:ext cx="6619504" cy="369332"/>
-              </a:xfrm>
-              <a:prstGeom prst="rect">
-                <a:avLst/>
-              </a:prstGeom>
               <a:blipFill>
-                <a:blip r:embed="rId5"/>
+                <a:blip r:embed="rId3"/>
                 <a:stretch>
-                  <a:fillRect l="-737" t="-10000" b="-26667"/>
+                  <a:fillRect l="-1043" t="-2241"/>
                 </a:stretch>
               </a:blipFill>
             </p:spPr>
@@ -7561,12 +7806,267 @@
           </p:sp>
         </mc:Fallback>
       </mc:AlternateContent>
+      <p:grpSp>
+        <p:nvGrpSpPr>
+          <p:cNvPr id="6" name="Group 5">
+            <a:extLst>
+              <a:ext uri="{FF2B5EF4-FFF2-40B4-BE49-F238E27FC236}">
+                <a16:creationId xmlns:a16="http://schemas.microsoft.com/office/drawing/2014/main" id="{9B88EE3C-8C96-49B1-ACF2-31E5FEA9783C}"/>
+              </a:ext>
+            </a:extLst>
+          </p:cNvPr>
+          <p:cNvGrpSpPr/>
+          <p:nvPr/>
+        </p:nvGrpSpPr>
+        <p:grpSpPr>
+          <a:xfrm>
+            <a:off x="3273519" y="1632427"/>
+            <a:ext cx="3561621" cy="1635184"/>
+            <a:chOff x="3403059" y="2539207"/>
+            <a:chExt cx="3561621" cy="1635184"/>
+          </a:xfrm>
+        </p:grpSpPr>
+        <p:pic>
+          <p:nvPicPr>
+            <p:cNvPr id="4" name="Picture 3">
+              <a:extLst>
+                <a:ext uri="{FF2B5EF4-FFF2-40B4-BE49-F238E27FC236}">
+                  <a16:creationId xmlns:a16="http://schemas.microsoft.com/office/drawing/2014/main" id="{2B170F7F-4B23-4BA6-A753-3D0BF8D59A91}"/>
+                </a:ext>
+              </a:extLst>
+            </p:cNvPr>
+            <p:cNvPicPr>
+              <a:picLocks noChangeAspect="1"/>
+            </p:cNvPicPr>
+            <p:nvPr/>
+          </p:nvPicPr>
+          <p:blipFill>
+            <a:blip r:embed="rId4"/>
+            <a:stretch>
+              <a:fillRect/>
+            </a:stretch>
+          </p:blipFill>
+          <p:spPr>
+            <a:xfrm>
+              <a:off x="3403059" y="2539207"/>
+              <a:ext cx="3561621" cy="1116330"/>
+            </a:xfrm>
+            <a:prstGeom prst="rect">
+              <a:avLst/>
+            </a:prstGeom>
+          </p:spPr>
+        </p:pic>
+        <mc:AlternateContent xmlns:mc="http://schemas.openxmlformats.org/markup-compatibility/2006">
+          <mc:Choice xmlns:a14="http://schemas.microsoft.com/office/drawing/2010/main" Requires="a14">
+            <p:sp>
+              <p:nvSpPr>
+                <p:cNvPr id="5" name="TextBox 4">
+                  <a:extLst>
+                    <a:ext uri="{FF2B5EF4-FFF2-40B4-BE49-F238E27FC236}">
+                      <a16:creationId xmlns:a16="http://schemas.microsoft.com/office/drawing/2014/main" id="{18D351A8-3462-48CE-90A5-44F023917A6D}"/>
+                    </a:ext>
+                  </a:extLst>
+                </p:cNvPr>
+                <p:cNvSpPr txBox="1"/>
+                <p:nvPr/>
+              </p:nvSpPr>
+              <p:spPr>
+                <a:xfrm>
+                  <a:off x="4450081" y="3528060"/>
+                  <a:ext cx="1577340" cy="646331"/>
+                </a:xfrm>
+                <a:prstGeom prst="rect">
+                  <a:avLst/>
+                </a:prstGeom>
+                <a:noFill/>
+              </p:spPr>
+              <p:txBody>
+                <a:bodyPr wrap="square" rtlCol="0">
+                  <a:spAutoFit/>
+                </a:bodyPr>
+                <a:lstStyle/>
+                <a:p>
+                  <a:pPr/>
+                  <a14:m>
+                    <m:oMathPara xmlns:m="http://schemas.openxmlformats.org/officeDocument/2006/math">
+                      <m:oMathParaPr>
+                        <m:jc m:val="centerGroup"/>
+                      </m:oMathParaPr>
+                      <m:oMath xmlns:m="http://schemas.openxmlformats.org/officeDocument/2006/math">
+                        <m:r>
+                          <a:rPr lang="en-US" i="1" smtClean="0">
+                            <a:latin typeface="Cambria Math" panose="02040503050406030204" pitchFamily="18" charset="0"/>
+                          </a:rPr>
+                          <m:t>(</m:t>
+                        </m:r>
+                        <m:sSub>
+                          <m:sSubPr>
+                            <m:ctrlPr>
+                              <a:rPr lang="en-US" i="1">
+                                <a:latin typeface="Cambria Math" panose="02040503050406030204" pitchFamily="18" charset="0"/>
+                              </a:rPr>
+                            </m:ctrlPr>
+                          </m:sSubPr>
+                          <m:e>
+                            <m:r>
+                              <a:rPr lang="en-US" i="1">
+                                <a:latin typeface="Cambria Math" panose="02040503050406030204" pitchFamily="18" charset="0"/>
+                              </a:rPr>
+                              <m:t>𝑎</m:t>
+                            </m:r>
+                          </m:e>
+                          <m:sub>
+                            <m:r>
+                              <a:rPr lang="en-US" i="1">
+                                <a:latin typeface="Cambria Math" panose="02040503050406030204" pitchFamily="18" charset="0"/>
+                              </a:rPr>
+                              <m:t>1</m:t>
+                            </m:r>
+                          </m:sub>
+                        </m:sSub>
+                        <m:r>
+                          <a:rPr lang="en-US" i="1">
+                            <a:latin typeface="Cambria Math" panose="02040503050406030204" pitchFamily="18" charset="0"/>
+                          </a:rPr>
+                          <m:t>,</m:t>
+                        </m:r>
+                        <m:sSub>
+                          <m:sSubPr>
+                            <m:ctrlPr>
+                              <a:rPr lang="en-US" i="1">
+                                <a:latin typeface="Cambria Math" panose="02040503050406030204" pitchFamily="18" charset="0"/>
+                              </a:rPr>
+                            </m:ctrlPr>
+                          </m:sSubPr>
+                          <m:e>
+                            <m:r>
+                              <a:rPr lang="en-US" i="1">
+                                <a:latin typeface="Cambria Math" panose="02040503050406030204" pitchFamily="18" charset="0"/>
+                              </a:rPr>
+                              <m:t>𝑣</m:t>
+                            </m:r>
+                          </m:e>
+                          <m:sub>
+                            <m:r>
+                              <a:rPr lang="en-US" i="1">
+                                <a:latin typeface="Cambria Math" panose="02040503050406030204" pitchFamily="18" charset="0"/>
+                              </a:rPr>
+                              <m:t>1</m:t>
+                            </m:r>
+                          </m:sub>
+                        </m:sSub>
+                        <m:r>
+                          <a:rPr lang="en-US" i="1">
+                            <a:latin typeface="Cambria Math" panose="02040503050406030204" pitchFamily="18" charset="0"/>
+                          </a:rPr>
+                          <m:t>, </m:t>
+                        </m:r>
+                        <m:sSub>
+                          <m:sSubPr>
+                            <m:ctrlPr>
+                              <a:rPr lang="en-US" i="1">
+                                <a:latin typeface="Cambria Math" panose="02040503050406030204" pitchFamily="18" charset="0"/>
+                              </a:rPr>
+                            </m:ctrlPr>
+                          </m:sSubPr>
+                          <m:e>
+                            <m:r>
+                              <a:rPr lang="en-US" i="1">
+                                <a:latin typeface="Cambria Math" panose="02040503050406030204" pitchFamily="18" charset="0"/>
+                              </a:rPr>
+                              <m:t>𝑣</m:t>
+                            </m:r>
+                          </m:e>
+                          <m:sub>
+                            <m:r>
+                              <a:rPr lang="en-US" i="1">
+                                <a:latin typeface="Cambria Math" panose="02040503050406030204" pitchFamily="18" charset="0"/>
+                              </a:rPr>
+                              <m:t>2</m:t>
+                            </m:r>
+                          </m:sub>
+                        </m:sSub>
+                        <m:r>
+                          <a:rPr lang="en-US" i="1">
+                            <a:latin typeface="Cambria Math" panose="02040503050406030204" pitchFamily="18" charset="0"/>
+                          </a:rPr>
+                          <m:t>,</m:t>
+                        </m:r>
+                        <m:r>
+                          <a:rPr lang="en-US" b="0" i="1" smtClean="0">
+                            <a:latin typeface="Cambria Math" panose="02040503050406030204" pitchFamily="18" charset="0"/>
+                          </a:rPr>
+                          <m:t>𝑡</m:t>
+                        </m:r>
+                        <m:r>
+                          <a:rPr lang="en-US" i="1">
+                            <a:latin typeface="Cambria Math" panose="02040503050406030204" pitchFamily="18" charset="0"/>
+                          </a:rPr>
+                          <m:t>)</m:t>
+                        </m:r>
+                      </m:oMath>
+                    </m:oMathPara>
+                  </a14:m>
+                  <a:endParaRPr lang="en-US" dirty="0"/>
+                </a:p>
+                <a:p>
+                  <a:endParaRPr lang="tr-TR" dirty="0"/>
+                </a:p>
+              </p:txBody>
+            </p:sp>
+          </mc:Choice>
+          <mc:Fallback>
+            <p:sp>
+              <p:nvSpPr>
+                <p:cNvPr id="5" name="TextBox 4">
+                  <a:extLst>
+                    <a:ext uri="{FF2B5EF4-FFF2-40B4-BE49-F238E27FC236}">
+                      <a16:creationId xmlns:a16="http://schemas.microsoft.com/office/drawing/2014/main" id="{18D351A8-3462-48CE-90A5-44F023917A6D}"/>
+                    </a:ext>
+                  </a:extLst>
+                </p:cNvPr>
+                <p:cNvSpPr txBox="1">
+                  <a:spLocks noRot="1" noChangeAspect="1" noMove="1" noResize="1" noEditPoints="1" noAdjustHandles="1" noChangeArrowheads="1" noChangeShapeType="1" noTextEdit="1"/>
+                </p:cNvSpPr>
+                <p:nvPr/>
+              </p:nvSpPr>
+              <p:spPr>
+                <a:xfrm>
+                  <a:off x="4450081" y="3528060"/>
+                  <a:ext cx="1577340" cy="646331"/>
+                </a:xfrm>
+                <a:prstGeom prst="rect">
+                  <a:avLst/>
+                </a:prstGeom>
+                <a:blipFill>
+                  <a:blip r:embed="rId5"/>
+                  <a:stretch>
+                    <a:fillRect/>
+                  </a:stretch>
+                </a:blipFill>
+              </p:spPr>
+              <p:txBody>
+                <a:bodyPr/>
+                <a:lstStyle/>
+                <a:p>
+                  <a:r>
+                    <a:rPr lang="tr-TR">
+                      <a:noFill/>
+                    </a:rPr>
+                    <a:t> </a:t>
+                  </a:r>
+                </a:p>
+              </p:txBody>
+            </p:sp>
+          </mc:Fallback>
+        </mc:AlternateContent>
+      </p:grpSp>
       <p:sp>
         <p:nvSpPr>
           <p:cNvPr id="7" name="Slide Number Placeholder 6">
             <a:extLst>
               <a:ext uri="{FF2B5EF4-FFF2-40B4-BE49-F238E27FC236}">
-                <a16:creationId xmlns:a16="http://schemas.microsoft.com/office/drawing/2014/main" id="{50C72735-EAB7-4EB6-94E6-CF4B8C58E1C1}"/>
+                <a16:creationId xmlns:a16="http://schemas.microsoft.com/office/drawing/2014/main" id="{826C51A9-6596-44FC-BAFC-03CF101E11C0}"/>
               </a:ext>
             </a:extLst>
           </p:cNvPr>
@@ -7593,7 +8093,7 @@
     </p:spTree>
     <p:extLst>
       <p:ext uri="{BB962C8B-B14F-4D97-AF65-F5344CB8AC3E}">
-        <p14:creationId xmlns:p14="http://schemas.microsoft.com/office/powerpoint/2010/main" val="328330867"/>
+        <p14:creationId xmlns:p14="http://schemas.microsoft.com/office/powerpoint/2010/main" val="1177107809"/>
       </p:ext>
     </p:extLst>
   </p:cSld>
@@ -7625,7 +8125,7 @@
           <p:cNvPr id="2" name="Title 1">
             <a:extLst>
               <a:ext uri="{FF2B5EF4-FFF2-40B4-BE49-F238E27FC236}">
-                <a16:creationId xmlns:a16="http://schemas.microsoft.com/office/drawing/2014/main" id="{D5167F7C-DFF2-483C-8B9F-3BE3C716551A}"/>
+                <a16:creationId xmlns:a16="http://schemas.microsoft.com/office/drawing/2014/main" id="{A83DED9F-D594-48E7-BBAD-290BE8B2D487}"/>
               </a:ext>
             </a:extLst>
           </p:cNvPr>
@@ -7654,7 +8154,7 @@
           <p:cNvPr id="3" name="Content Placeholder 2">
             <a:extLst>
               <a:ext uri="{FF2B5EF4-FFF2-40B4-BE49-F238E27FC236}">
-                <a16:creationId xmlns:a16="http://schemas.microsoft.com/office/drawing/2014/main" id="{A8616626-3EEB-41FD-A970-07EC85795DC4}"/>
+                <a16:creationId xmlns:a16="http://schemas.microsoft.com/office/drawing/2014/main" id="{1C5E9715-7B23-4555-96A9-B6FA7963A73C}"/>
               </a:ext>
             </a:extLst>
           </p:cNvPr>
@@ -7665,12 +8165,21 @@
             <p:ph idx="1"/>
           </p:nvPr>
         </p:nvSpPr>
-        <p:spPr/>
-        <p:txBody>
-          <a:bodyPr/>
-          <a:lstStyle/>
-          <a:p>
-            <a:endParaRPr lang="tr-TR"/>
+        <p:spPr>
+          <a:xfrm>
+            <a:off x="838200" y="1825625"/>
+            <a:ext cx="10515600" cy="4351338"/>
+          </a:xfrm>
+        </p:spPr>
+        <p:txBody>
+          <a:bodyPr/>
+          <a:lstStyle/>
+          <a:p>
+            <a:r>
+              <a:rPr lang="en-US" dirty="0"/>
+              <a:t>Low-Level: any optimal single agent pathfinding algorithm which can satisfies all the constraint such as A*, can be used</a:t>
+            </a:r>
+            <a:endParaRPr lang="tr-TR" dirty="0"/>
           </a:p>
         </p:txBody>
       </p:sp>
@@ -7679,7 +8188,7 @@
           <p:cNvPr id="4" name="Picture 3">
             <a:extLst>
               <a:ext uri="{FF2B5EF4-FFF2-40B4-BE49-F238E27FC236}">
-                <a16:creationId xmlns:a16="http://schemas.microsoft.com/office/drawing/2014/main" id="{55AD5471-6367-4A53-BF4A-CFDAA73741FF}"/>
+                <a16:creationId xmlns:a16="http://schemas.microsoft.com/office/drawing/2014/main" id="{E7BA8906-E22E-4338-9FB7-0E36DEB25B72}"/>
               </a:ext>
             </a:extLst>
           </p:cNvPr>
@@ -7696,20 +8205,50 @@
         </p:blipFill>
         <p:spPr>
           <a:xfrm>
-            <a:off x="838200" y="1690688"/>
-            <a:ext cx="7943661" cy="4667101"/>
+            <a:off x="6182989" y="2619484"/>
+            <a:ext cx="3626565" cy="2763617"/>
           </a:xfrm>
           <a:prstGeom prst="rect">
             <a:avLst/>
           </a:prstGeom>
         </p:spPr>
       </p:pic>
-      <p:sp>
-        <p:nvSpPr>
-          <p:cNvPr id="5" name="Slide Number Placeholder 4">
-            <a:extLst>
-              <a:ext uri="{FF2B5EF4-FFF2-40B4-BE49-F238E27FC236}">
-                <a16:creationId xmlns:a16="http://schemas.microsoft.com/office/drawing/2014/main" id="{7E298690-A694-4986-B9BC-82D127C9E1DF}"/>
+      <p:pic>
+        <p:nvPicPr>
+          <p:cNvPr id="5" name="Picture 4">
+            <a:extLst>
+              <a:ext uri="{FF2B5EF4-FFF2-40B4-BE49-F238E27FC236}">
+                <a16:creationId xmlns:a16="http://schemas.microsoft.com/office/drawing/2014/main" id="{7EB7CB65-31D8-4F21-B9C1-2EE0F179A48A}"/>
+              </a:ext>
+            </a:extLst>
+          </p:cNvPr>
+          <p:cNvPicPr>
+            <a:picLocks noChangeAspect="1"/>
+          </p:cNvPicPr>
+          <p:nvPr/>
+        </p:nvPicPr>
+        <p:blipFill>
+          <a:blip r:embed="rId4"/>
+          <a:stretch>
+            <a:fillRect/>
+          </a:stretch>
+        </p:blipFill>
+        <p:spPr>
+          <a:xfrm>
+            <a:off x="1486832" y="2754239"/>
+            <a:ext cx="2555239" cy="2494109"/>
+          </a:xfrm>
+          <a:prstGeom prst="rect">
+            <a:avLst/>
+          </a:prstGeom>
+        </p:spPr>
+      </p:pic>
+      <p:sp>
+        <p:nvSpPr>
+          <p:cNvPr id="7" name="Slide Number Placeholder 6">
+            <a:extLst>
+              <a:ext uri="{FF2B5EF4-FFF2-40B4-BE49-F238E27FC236}">
+                <a16:creationId xmlns:a16="http://schemas.microsoft.com/office/drawing/2014/main" id="{50C72735-EAB7-4EB6-94E6-CF4B8C58E1C1}"/>
               </a:ext>
             </a:extLst>
           </p:cNvPr>
@@ -7736,7 +8275,7 @@
     </p:spTree>
     <p:extLst>
       <p:ext uri="{BB962C8B-B14F-4D97-AF65-F5344CB8AC3E}">
-        <p14:creationId xmlns:p14="http://schemas.microsoft.com/office/powerpoint/2010/main" val="1345273416"/>
+        <p14:creationId xmlns:p14="http://schemas.microsoft.com/office/powerpoint/2010/main" val="328330867"/>
       </p:ext>
     </p:extLst>
   </p:cSld>
@@ -7768,6 +8307,149 @@
           <p:cNvPr id="2" name="Title 1">
             <a:extLst>
               <a:ext uri="{FF2B5EF4-FFF2-40B4-BE49-F238E27FC236}">
+                <a16:creationId xmlns:a16="http://schemas.microsoft.com/office/drawing/2014/main" id="{D5167F7C-DFF2-483C-8B9F-3BE3C716551A}"/>
+              </a:ext>
+            </a:extLst>
+          </p:cNvPr>
+          <p:cNvSpPr>
+            <a:spLocks noGrp="1"/>
+          </p:cNvSpPr>
+          <p:nvPr>
+            <p:ph type="title"/>
+          </p:nvPr>
+        </p:nvSpPr>
+        <p:spPr/>
+        <p:txBody>
+          <a:bodyPr/>
+          <a:lstStyle/>
+          <a:p>
+            <a:r>
+              <a:rPr lang="en-US" dirty="0"/>
+              <a:t>CBS</a:t>
+            </a:r>
+            <a:endParaRPr lang="tr-TR" dirty="0"/>
+          </a:p>
+        </p:txBody>
+      </p:sp>
+      <p:sp>
+        <p:nvSpPr>
+          <p:cNvPr id="3" name="Content Placeholder 2">
+            <a:extLst>
+              <a:ext uri="{FF2B5EF4-FFF2-40B4-BE49-F238E27FC236}">
+                <a16:creationId xmlns:a16="http://schemas.microsoft.com/office/drawing/2014/main" id="{A8616626-3EEB-41FD-A970-07EC85795DC4}"/>
+              </a:ext>
+            </a:extLst>
+          </p:cNvPr>
+          <p:cNvSpPr>
+            <a:spLocks noGrp="1"/>
+          </p:cNvSpPr>
+          <p:nvPr>
+            <p:ph idx="1"/>
+          </p:nvPr>
+        </p:nvSpPr>
+        <p:spPr/>
+        <p:txBody>
+          <a:bodyPr/>
+          <a:lstStyle/>
+          <a:p>
+            <a:endParaRPr lang="tr-TR"/>
+          </a:p>
+        </p:txBody>
+      </p:sp>
+      <p:pic>
+        <p:nvPicPr>
+          <p:cNvPr id="4" name="Picture 3">
+            <a:extLst>
+              <a:ext uri="{FF2B5EF4-FFF2-40B4-BE49-F238E27FC236}">
+                <a16:creationId xmlns:a16="http://schemas.microsoft.com/office/drawing/2014/main" id="{55AD5471-6367-4A53-BF4A-CFDAA73741FF}"/>
+              </a:ext>
+            </a:extLst>
+          </p:cNvPr>
+          <p:cNvPicPr>
+            <a:picLocks noChangeAspect="1"/>
+          </p:cNvPicPr>
+          <p:nvPr/>
+        </p:nvPicPr>
+        <p:blipFill>
+          <a:blip r:embed="rId3"/>
+          <a:stretch>
+            <a:fillRect/>
+          </a:stretch>
+        </p:blipFill>
+        <p:spPr>
+          <a:xfrm>
+            <a:off x="838200" y="1690688"/>
+            <a:ext cx="7943661" cy="4667101"/>
+          </a:xfrm>
+          <a:prstGeom prst="rect">
+            <a:avLst/>
+          </a:prstGeom>
+        </p:spPr>
+      </p:pic>
+      <p:sp>
+        <p:nvSpPr>
+          <p:cNvPr id="5" name="Slide Number Placeholder 4">
+            <a:extLst>
+              <a:ext uri="{FF2B5EF4-FFF2-40B4-BE49-F238E27FC236}">
+                <a16:creationId xmlns:a16="http://schemas.microsoft.com/office/drawing/2014/main" id="{7E298690-A694-4986-B9BC-82D127C9E1DF}"/>
+              </a:ext>
+            </a:extLst>
+          </p:cNvPr>
+          <p:cNvSpPr>
+            <a:spLocks noGrp="1"/>
+          </p:cNvSpPr>
+          <p:nvPr>
+            <p:ph type="sldNum" sz="quarter" idx="12"/>
+          </p:nvPr>
+        </p:nvSpPr>
+        <p:spPr/>
+        <p:txBody>
+          <a:bodyPr/>
+          <a:lstStyle/>
+          <a:p>
+            <a:fld id="{4B024B25-DFCA-4944-BA90-A17C573440F7}" type="slidenum">
+              <a:rPr lang="tr-TR" smtClean="0"/>
+              <a:t>12</a:t>
+            </a:fld>
+            <a:endParaRPr lang="tr-TR"/>
+          </a:p>
+        </p:txBody>
+      </p:sp>
+    </p:spTree>
+    <p:extLst>
+      <p:ext uri="{BB962C8B-B14F-4D97-AF65-F5344CB8AC3E}">
+        <p14:creationId xmlns:p14="http://schemas.microsoft.com/office/powerpoint/2010/main" val="1345273416"/>
+      </p:ext>
+    </p:extLst>
+  </p:cSld>
+  <p:clrMapOvr>
+    <a:masterClrMapping/>
+  </p:clrMapOvr>
+</p:sld>
+</file>
+
+<file path=ppt/slides/slide13.xml><?xml version="1.0" encoding="utf-8"?>
+<p:sld xmlns:a="http://schemas.openxmlformats.org/drawingml/2006/main" xmlns:r="http://schemas.openxmlformats.org/officeDocument/2006/relationships" xmlns:p="http://schemas.openxmlformats.org/presentationml/2006/main">
+  <p:cSld>
+    <p:spTree>
+      <p:nvGrpSpPr>
+        <p:cNvPr id="1" name=""/>
+        <p:cNvGrpSpPr/>
+        <p:nvPr/>
+      </p:nvGrpSpPr>
+      <p:grpSpPr>
+        <a:xfrm>
+          <a:off x="0" y="0"/>
+          <a:ext cx="0" cy="0"/>
+          <a:chOff x="0" y="0"/>
+          <a:chExt cx="0" cy="0"/>
+        </a:xfrm>
+      </p:grpSpPr>
+      <p:sp>
+        <p:nvSpPr>
+          <p:cNvPr id="2" name="Title 1">
+            <a:extLst>
+              <a:ext uri="{FF2B5EF4-FFF2-40B4-BE49-F238E27FC236}">
                 <a16:creationId xmlns:a16="http://schemas.microsoft.com/office/drawing/2014/main" id="{D0F81B46-C94F-4C9E-BD56-E67F73765C03}"/>
               </a:ext>
             </a:extLst>
@@ -7792,8 +8474,8 @@
           </a:p>
         </p:txBody>
       </p:sp>
-      <mc:AlternateContent xmlns:mc="http://schemas.openxmlformats.org/markup-compatibility/2006" xmlns:a14="http://schemas.microsoft.com/office/drawing/2010/main">
-        <mc:Choice Requires="a14">
+      <mc:AlternateContent xmlns:mc="http://schemas.openxmlformats.org/markup-compatibility/2006">
+        <mc:Choice xmlns:a14="http://schemas.microsoft.com/office/drawing/2010/main" Requires="a14">
           <p:sp>
             <p:nvSpPr>
               <p:cNvPr id="3" name="Content Placeholder 2">
@@ -8074,12 +8756,52 @@
                   <a:rPr lang="en-US" sz="2400" dirty="0"/>
                   <a:t>) low level nodes</a:t>
                 </a:r>
+              </a:p>
+              <a:p>
+                <a:r>
+                  <a:rPr lang="en-US" sz="2400" dirty="0"/>
+                  <a:t>CBS </a:t>
+                </a:r>
+                <a:r>
+                  <a:rPr lang="tr-TR" sz="2400" dirty="0" err="1"/>
+                  <a:t>outperform</a:t>
+                </a:r>
+                <a:r>
+                  <a:rPr lang="en-US" sz="2400" dirty="0"/>
+                  <a:t> A* when </a:t>
+                </a:r>
+                <a14:m>
+                  <m:oMath xmlns:m="http://schemas.openxmlformats.org/officeDocument/2006/math">
+                    <m:acc>
+                      <m:accPr>
+                        <m:chr m:val="̅"/>
+                        <m:ctrlPr>
+                          <a:rPr lang="en-US" sz="2400" i="1">
+                            <a:latin typeface="Cambria Math" panose="02040503050406030204" pitchFamily="18" charset="0"/>
+                          </a:rPr>
+                        </m:ctrlPr>
+                      </m:accPr>
+                      <m:e>
+                        <m:r>
+                          <a:rPr lang="en-US" sz="2400" i="1">
+                            <a:latin typeface="Cambria Math" panose="02040503050406030204" pitchFamily="18" charset="0"/>
+                          </a:rPr>
+                          <m:t>𝑌</m:t>
+                        </m:r>
+                      </m:e>
+                    </m:acc>
+                  </m:oMath>
+                </a14:m>
+                <a:r>
+                  <a:rPr lang="en-US" sz="2400" dirty="0"/>
+                  <a:t> &gt;&gt; X</a:t>
+                </a:r>
                 <a:endParaRPr lang="tr-TR" sz="2400" dirty="0"/>
               </a:p>
             </p:txBody>
           </p:sp>
         </mc:Choice>
-        <mc:Fallback xmlns="">
+        <mc:Fallback>
           <p:sp>
             <p:nvSpPr>
               <p:cNvPr id="3" name="Content Placeholder 2">
@@ -8142,7 +8864,7 @@
           <a:p>
             <a:fld id="{4B024B25-DFCA-4944-BA90-A17C573440F7}" type="slidenum">
               <a:rPr lang="tr-TR" smtClean="0"/>
-              <a:t>12</a:t>
+              <a:t>13</a:t>
             </a:fld>
             <a:endParaRPr lang="tr-TR"/>
           </a:p>
@@ -8202,192 +8924,6 @@
     <p:extLst>
       <p:ext uri="{BB962C8B-B14F-4D97-AF65-F5344CB8AC3E}">
         <p14:creationId xmlns:p14="http://schemas.microsoft.com/office/powerpoint/2010/main" val="1555944432"/>
-      </p:ext>
-    </p:extLst>
-  </p:cSld>
-  <p:clrMapOvr>
-    <a:masterClrMapping/>
-  </p:clrMapOvr>
-</p:sld>
-</file>
-
-<file path=ppt/slides/slide13.xml><?xml version="1.0" encoding="utf-8"?>
-<p:sld xmlns:a="http://schemas.openxmlformats.org/drawingml/2006/main" xmlns:r="http://schemas.openxmlformats.org/officeDocument/2006/relationships" xmlns:p="http://schemas.openxmlformats.org/presentationml/2006/main">
-  <p:cSld>
-    <p:spTree>
-      <p:nvGrpSpPr>
-        <p:cNvPr id="1" name=""/>
-        <p:cNvGrpSpPr/>
-        <p:nvPr/>
-      </p:nvGrpSpPr>
-      <p:grpSpPr>
-        <a:xfrm>
-          <a:off x="0" y="0"/>
-          <a:ext cx="0" cy="0"/>
-          <a:chOff x="0" y="0"/>
-          <a:chExt cx="0" cy="0"/>
-        </a:xfrm>
-      </p:grpSpPr>
-      <p:pic>
-        <p:nvPicPr>
-          <p:cNvPr id="5" name="Picture 4">
-            <a:extLst>
-              <a:ext uri="{FF2B5EF4-FFF2-40B4-BE49-F238E27FC236}">
-                <a16:creationId xmlns:a16="http://schemas.microsoft.com/office/drawing/2014/main" id="{757100F0-5E17-4E28-803F-0E8C9C4EB101}"/>
-              </a:ext>
-            </a:extLst>
-          </p:cNvPr>
-          <p:cNvPicPr>
-            <a:picLocks noChangeAspect="1"/>
-          </p:cNvPicPr>
-          <p:nvPr/>
-        </p:nvPicPr>
-        <p:blipFill>
-          <a:blip r:embed="rId3"/>
-          <a:stretch>
-            <a:fillRect/>
-          </a:stretch>
-        </p:blipFill>
-        <p:spPr>
-          <a:xfrm>
-            <a:off x="5188347" y="2477771"/>
-            <a:ext cx="6165453" cy="4015104"/>
-          </a:xfrm>
-          <a:prstGeom prst="rect">
-            <a:avLst/>
-          </a:prstGeom>
-        </p:spPr>
-      </p:pic>
-      <p:sp>
-        <p:nvSpPr>
-          <p:cNvPr id="2" name="Title 1">
-            <a:extLst>
-              <a:ext uri="{FF2B5EF4-FFF2-40B4-BE49-F238E27FC236}">
-                <a16:creationId xmlns:a16="http://schemas.microsoft.com/office/drawing/2014/main" id="{89B09484-B546-4A48-A641-AE095CE085D8}"/>
-              </a:ext>
-            </a:extLst>
-          </p:cNvPr>
-          <p:cNvSpPr>
-            <a:spLocks noGrp="1"/>
-          </p:cNvSpPr>
-          <p:nvPr>
-            <p:ph type="title"/>
-          </p:nvPr>
-        </p:nvSpPr>
-        <p:spPr/>
-        <p:txBody>
-          <a:bodyPr/>
-          <a:lstStyle/>
-          <a:p>
-            <a:r>
-              <a:rPr lang="en-US" dirty="0"/>
-              <a:t>Comparison of A* and CBS</a:t>
-            </a:r>
-            <a:endParaRPr lang="tr-TR" dirty="0"/>
-          </a:p>
-        </p:txBody>
-      </p:sp>
-      <p:sp>
-        <p:nvSpPr>
-          <p:cNvPr id="3" name="Content Placeholder 2">
-            <a:extLst>
-              <a:ext uri="{FF2B5EF4-FFF2-40B4-BE49-F238E27FC236}">
-                <a16:creationId xmlns:a16="http://schemas.microsoft.com/office/drawing/2014/main" id="{F6858EBE-EF96-4AC4-A5D7-17D1FD4BF7FD}"/>
-              </a:ext>
-            </a:extLst>
-          </p:cNvPr>
-          <p:cNvSpPr>
-            <a:spLocks noGrp="1"/>
-          </p:cNvSpPr>
-          <p:nvPr>
-            <p:ph idx="1"/>
-          </p:nvPr>
-        </p:nvSpPr>
-        <p:spPr/>
-        <p:txBody>
-          <a:bodyPr/>
-          <a:lstStyle/>
-          <a:p>
-            <a:r>
-              <a:rPr lang="en-US" dirty="0"/>
-              <a:t>CBS will expand 8 + 4 · 4 + 6 · 5 = 54 low level nodes</a:t>
-            </a:r>
-          </a:p>
-          <a:p>
-            <a:r>
-              <a:rPr lang="en-US" dirty="0"/>
-              <a:t>A* will expand 5 + 3 = 8 nodes</a:t>
-            </a:r>
-            <a:endParaRPr lang="tr-TR" dirty="0"/>
-          </a:p>
-          <a:p>
-            <a:endParaRPr lang="tr-TR" dirty="0"/>
-          </a:p>
-        </p:txBody>
-      </p:sp>
-      <p:pic>
-        <p:nvPicPr>
-          <p:cNvPr id="4" name="Picture 3">
-            <a:extLst>
-              <a:ext uri="{FF2B5EF4-FFF2-40B4-BE49-F238E27FC236}">
-                <a16:creationId xmlns:a16="http://schemas.microsoft.com/office/drawing/2014/main" id="{065B89E3-2C95-46D1-9747-451896B2E750}"/>
-              </a:ext>
-            </a:extLst>
-          </p:cNvPr>
-          <p:cNvPicPr>
-            <a:picLocks noChangeAspect="1"/>
-          </p:cNvPicPr>
-          <p:nvPr/>
-        </p:nvPicPr>
-        <p:blipFill>
-          <a:blip r:embed="rId4"/>
-          <a:stretch>
-            <a:fillRect/>
-          </a:stretch>
-        </p:blipFill>
-        <p:spPr>
-          <a:xfrm>
-            <a:off x="659779" y="3429000"/>
-            <a:ext cx="4244190" cy="2969696"/>
-          </a:xfrm>
-          <a:prstGeom prst="rect">
-            <a:avLst/>
-          </a:prstGeom>
-        </p:spPr>
-      </p:pic>
-      <p:sp>
-        <p:nvSpPr>
-          <p:cNvPr id="6" name="Slide Number Placeholder 5">
-            <a:extLst>
-              <a:ext uri="{FF2B5EF4-FFF2-40B4-BE49-F238E27FC236}">
-                <a16:creationId xmlns:a16="http://schemas.microsoft.com/office/drawing/2014/main" id="{BDA30B9E-62AD-45FD-BE07-5048F739080B}"/>
-              </a:ext>
-            </a:extLst>
-          </p:cNvPr>
-          <p:cNvSpPr>
-            <a:spLocks noGrp="1"/>
-          </p:cNvSpPr>
-          <p:nvPr>
-            <p:ph type="sldNum" sz="quarter" idx="12"/>
-          </p:nvPr>
-        </p:nvSpPr>
-        <p:spPr/>
-        <p:txBody>
-          <a:bodyPr/>
-          <a:lstStyle/>
-          <a:p>
-            <a:fld id="{4B024B25-DFCA-4944-BA90-A17C573440F7}" type="slidenum">
-              <a:rPr lang="tr-TR" smtClean="0"/>
-              <a:t>13</a:t>
-            </a:fld>
-            <a:endParaRPr lang="tr-TR"/>
-          </a:p>
-        </p:txBody>
-      </p:sp>
-    </p:spTree>
-    <p:extLst>
-      <p:ext uri="{BB962C8B-B14F-4D97-AF65-F5344CB8AC3E}">
-        <p14:creationId xmlns:p14="http://schemas.microsoft.com/office/powerpoint/2010/main" val="331830905"/>
       </p:ext>
     </p:extLst>
   </p:cSld>
@@ -8414,66 +8950,12 @@
           <a:chExt cx="0" cy="0"/>
         </a:xfrm>
       </p:grpSpPr>
-      <p:sp>
-        <p:nvSpPr>
-          <p:cNvPr id="2" name="Title 1">
-            <a:extLst>
-              <a:ext uri="{FF2B5EF4-FFF2-40B4-BE49-F238E27FC236}">
-                <a16:creationId xmlns:a16="http://schemas.microsoft.com/office/drawing/2014/main" id="{FD61823E-C56F-41DB-B07A-BC9DC0F39708}"/>
-              </a:ext>
-            </a:extLst>
-          </p:cNvPr>
-          <p:cNvSpPr>
-            <a:spLocks noGrp="1"/>
-          </p:cNvSpPr>
-          <p:nvPr>
-            <p:ph type="title"/>
-          </p:nvPr>
-        </p:nvSpPr>
-        <p:spPr/>
-        <p:txBody>
-          <a:bodyPr/>
-          <a:lstStyle/>
-          <a:p>
-            <a:r>
-              <a:rPr lang="en-US" dirty="0"/>
-              <a:t>8x8 Grid</a:t>
-            </a:r>
-            <a:endParaRPr lang="tr-TR" dirty="0"/>
-          </a:p>
-        </p:txBody>
-      </p:sp>
-      <p:sp>
-        <p:nvSpPr>
-          <p:cNvPr id="3" name="Content Placeholder 2">
-            <a:extLst>
-              <a:ext uri="{FF2B5EF4-FFF2-40B4-BE49-F238E27FC236}">
-                <a16:creationId xmlns:a16="http://schemas.microsoft.com/office/drawing/2014/main" id="{DB249683-9EF3-4C21-8B07-4A9D6644FDD3}"/>
-              </a:ext>
-            </a:extLst>
-          </p:cNvPr>
-          <p:cNvSpPr>
-            <a:spLocks noGrp="1"/>
-          </p:cNvSpPr>
-          <p:nvPr>
-            <p:ph idx="1"/>
-          </p:nvPr>
-        </p:nvSpPr>
-        <p:spPr/>
-        <p:txBody>
-          <a:bodyPr/>
-          <a:lstStyle/>
-          <a:p>
-            <a:endParaRPr lang="tr-TR" dirty="0"/>
-          </a:p>
-        </p:txBody>
-      </p:sp>
       <p:pic>
         <p:nvPicPr>
-          <p:cNvPr id="4" name="Picture 3">
-            <a:extLst>
-              <a:ext uri="{FF2B5EF4-FFF2-40B4-BE49-F238E27FC236}">
-                <a16:creationId xmlns:a16="http://schemas.microsoft.com/office/drawing/2014/main" id="{6AC9BC14-FB3F-4B54-BE46-BD55BB0F91D5}"/>
+          <p:cNvPr id="5" name="Picture 4">
+            <a:extLst>
+              <a:ext uri="{FF2B5EF4-FFF2-40B4-BE49-F238E27FC236}">
+                <a16:creationId xmlns:a16="http://schemas.microsoft.com/office/drawing/2014/main" id="{757100F0-5E17-4E28-803F-0E8C9C4EB101}"/>
               </a:ext>
             </a:extLst>
           </p:cNvPr>
@@ -8483,27 +8965,208 @@
           <p:nvPr/>
         </p:nvPicPr>
         <p:blipFill>
-          <a:blip r:embed="rId3"/>
+          <a:blip r:embed="rId3">
+            <a:extLst>
+              <a:ext uri="{28A0092B-C50C-407E-A947-70E740481C1C}">
+                <a14:useLocalDpi xmlns:a14="http://schemas.microsoft.com/office/drawing/2010/main" val="0"/>
+              </a:ext>
+            </a:extLst>
+          </a:blip>
           <a:stretch>
             <a:fillRect/>
           </a:stretch>
         </p:blipFill>
         <p:spPr>
           <a:xfrm>
-            <a:off x="6850454" y="585008"/>
-            <a:ext cx="4610743" cy="2629267"/>
+            <a:off x="6151075" y="3132264"/>
+            <a:ext cx="3855274" cy="2935192"/>
           </a:xfrm>
           <a:prstGeom prst="rect">
             <a:avLst/>
           </a:prstGeom>
         </p:spPr>
       </p:pic>
+      <p:sp>
+        <p:nvSpPr>
+          <p:cNvPr id="2" name="Title 1">
+            <a:extLst>
+              <a:ext uri="{FF2B5EF4-FFF2-40B4-BE49-F238E27FC236}">
+                <a16:creationId xmlns:a16="http://schemas.microsoft.com/office/drawing/2014/main" id="{89B09484-B546-4A48-A641-AE095CE085D8}"/>
+              </a:ext>
+            </a:extLst>
+          </p:cNvPr>
+          <p:cNvSpPr>
+            <a:spLocks noGrp="1"/>
+          </p:cNvSpPr>
+          <p:nvPr>
+            <p:ph type="title"/>
+          </p:nvPr>
+        </p:nvSpPr>
+        <p:spPr/>
+        <p:txBody>
+          <a:bodyPr/>
+          <a:lstStyle/>
+          <a:p>
+            <a:r>
+              <a:rPr lang="en-US" dirty="0"/>
+              <a:t>Comparison of A* and CBS</a:t>
+            </a:r>
+            <a:endParaRPr lang="tr-TR" dirty="0"/>
+          </a:p>
+        </p:txBody>
+      </p:sp>
+      <mc:AlternateContent xmlns:mc="http://schemas.openxmlformats.org/markup-compatibility/2006">
+        <mc:Choice xmlns:a14="http://schemas.microsoft.com/office/drawing/2010/main" Requires="a14">
+          <p:sp>
+            <p:nvSpPr>
+              <p:cNvPr id="3" name="Content Placeholder 2">
+                <a:extLst>
+                  <a:ext uri="{FF2B5EF4-FFF2-40B4-BE49-F238E27FC236}">
+                    <a16:creationId xmlns:a16="http://schemas.microsoft.com/office/drawing/2014/main" id="{F6858EBE-EF96-4AC4-A5D7-17D1FD4BF7FD}"/>
+                  </a:ext>
+                </a:extLst>
+              </p:cNvPr>
+              <p:cNvSpPr>
+                <a:spLocks noGrp="1"/>
+              </p:cNvSpPr>
+              <p:nvPr>
+                <p:ph idx="1"/>
+              </p:nvPr>
+            </p:nvSpPr>
+            <p:spPr/>
+            <p:txBody>
+              <a:bodyPr/>
+              <a:lstStyle/>
+              <a:p>
+                <a:r>
+                  <a:rPr lang="en-US" dirty="0"/>
+                  <a:t>CBS will expand </a:t>
+                </a:r>
+                <a14:m>
+                  <m:oMath xmlns:m="http://schemas.openxmlformats.org/officeDocument/2006/math">
+                    <m:r>
+                      <a:rPr lang="en-US" i="1" dirty="0">
+                        <a:latin typeface="Cambria Math" panose="02040503050406030204" pitchFamily="18" charset="0"/>
+                      </a:rPr>
+                      <m:t>2</m:t>
+                    </m:r>
+                    <m:r>
+                      <a:rPr lang="en-US" i="1" dirty="0">
+                        <a:latin typeface="Cambria Math" panose="02040503050406030204" pitchFamily="18" charset="0"/>
+                      </a:rPr>
+                      <m:t>𝑚</m:t>
+                    </m:r>
+                    <m:r>
+                      <a:rPr lang="en-US" i="1" dirty="0">
+                        <a:latin typeface="Cambria Math" panose="02040503050406030204" pitchFamily="18" charset="0"/>
+                      </a:rPr>
+                      <m:t>+14</m:t>
+                    </m:r>
+                  </m:oMath>
+                </a14:m>
+                <a:r>
+                  <a:rPr lang="en-US" dirty="0"/>
+                  <a:t> low level nodes</a:t>
+                </a:r>
+              </a:p>
+              <a:p>
+                <a:r>
+                  <a:rPr lang="en-US" dirty="0"/>
+                  <a:t>A* will expand </a:t>
+                </a:r>
+                <a14:m>
+                  <m:oMath xmlns:m="http://schemas.openxmlformats.org/officeDocument/2006/math">
+                    <m:sSup>
+                      <m:sSupPr>
+                        <m:ctrlPr>
+                          <a:rPr lang="en-US" i="1">
+                            <a:latin typeface="Cambria Math" panose="02040503050406030204" pitchFamily="18" charset="0"/>
+                          </a:rPr>
+                        </m:ctrlPr>
+                      </m:sSupPr>
+                      <m:e>
+                        <m:r>
+                          <a:rPr lang="en-US" i="1">
+                            <a:latin typeface="Cambria Math" panose="02040503050406030204" pitchFamily="18" charset="0"/>
+                          </a:rPr>
+                          <m:t>𝑚</m:t>
+                        </m:r>
+                      </m:e>
+                      <m:sup>
+                        <m:r>
+                          <a:rPr lang="en-US" i="1">
+                            <a:latin typeface="Cambria Math" panose="02040503050406030204" pitchFamily="18" charset="0"/>
+                          </a:rPr>
+                          <m:t>2</m:t>
+                        </m:r>
+                      </m:sup>
+                    </m:sSup>
+                    <m:r>
+                      <a:rPr lang="en-US" i="1">
+                        <a:latin typeface="Cambria Math" panose="02040503050406030204" pitchFamily="18" charset="0"/>
+                      </a:rPr>
+                      <m:t>+3</m:t>
+                    </m:r>
+                  </m:oMath>
+                </a14:m>
+                <a:r>
+                  <a:rPr lang="en-US" dirty="0"/>
+                  <a:t> nodes</a:t>
+                </a:r>
+                <a:endParaRPr lang="tr-TR" dirty="0"/>
+              </a:p>
+              <a:p>
+                <a:endParaRPr lang="tr-TR" dirty="0"/>
+              </a:p>
+            </p:txBody>
+          </p:sp>
+        </mc:Choice>
+        <mc:Fallback>
+          <p:sp>
+            <p:nvSpPr>
+              <p:cNvPr id="3" name="Content Placeholder 2">
+                <a:extLst>
+                  <a:ext uri="{FF2B5EF4-FFF2-40B4-BE49-F238E27FC236}">
+                    <a16:creationId xmlns:a16="http://schemas.microsoft.com/office/drawing/2014/main" id="{F6858EBE-EF96-4AC4-A5D7-17D1FD4BF7FD}"/>
+                  </a:ext>
+                </a:extLst>
+              </p:cNvPr>
+              <p:cNvSpPr>
+                <a:spLocks noGrp="1" noRot="1" noChangeAspect="1" noMove="1" noResize="1" noEditPoints="1" noAdjustHandles="1" noChangeArrowheads="1" noChangeShapeType="1" noTextEdit="1"/>
+              </p:cNvSpPr>
+              <p:nvPr>
+                <p:ph idx="1"/>
+              </p:nvPr>
+            </p:nvSpPr>
+            <p:spPr>
+              <a:blipFill>
+                <a:blip r:embed="rId4"/>
+                <a:stretch>
+                  <a:fillRect l="-1043" t="-2241"/>
+                </a:stretch>
+              </a:blipFill>
+            </p:spPr>
+            <p:txBody>
+              <a:bodyPr/>
+              <a:lstStyle/>
+              <a:p>
+                <a:r>
+                  <a:rPr lang="tr-TR">
+                    <a:noFill/>
+                  </a:rPr>
+                  <a:t> </a:t>
+                </a:r>
+              </a:p>
+            </p:txBody>
+          </p:sp>
+        </mc:Fallback>
+      </mc:AlternateContent>
       <p:pic>
         <p:nvPicPr>
-          <p:cNvPr id="6" name="Picture 5">
-            <a:extLst>
-              <a:ext uri="{FF2B5EF4-FFF2-40B4-BE49-F238E27FC236}">
-                <a16:creationId xmlns:a16="http://schemas.microsoft.com/office/drawing/2014/main" id="{C34A203A-3BE4-4066-A79F-0D5C5D20AC52}"/>
+          <p:cNvPr id="4" name="Picture 3">
+            <a:extLst>
+              <a:ext uri="{FF2B5EF4-FFF2-40B4-BE49-F238E27FC236}">
+                <a16:creationId xmlns:a16="http://schemas.microsoft.com/office/drawing/2014/main" id="{065B89E3-2C95-46D1-9747-451896B2E750}"/>
               </a:ext>
             </a:extLst>
           </p:cNvPr>
@@ -8513,15 +9176,21 @@
           <p:nvPr/>
         </p:nvPicPr>
         <p:blipFill>
-          <a:blip r:embed="rId4"/>
+          <a:blip r:embed="rId5">
+            <a:extLst>
+              <a:ext uri="{28A0092B-C50C-407E-A947-70E740481C1C}">
+                <a14:useLocalDpi xmlns:a14="http://schemas.microsoft.com/office/drawing/2010/main" val="0"/>
+              </a:ext>
+            </a:extLst>
+          </a:blip>
           <a:stretch>
             <a:fillRect/>
           </a:stretch>
         </p:blipFill>
         <p:spPr>
           <a:xfrm>
-            <a:off x="448761" y="3310304"/>
-            <a:ext cx="8707065" cy="2962688"/>
+            <a:off x="1761320" y="3274736"/>
+            <a:ext cx="3042304" cy="2969696"/>
           </a:xfrm>
           <a:prstGeom prst="rect">
             <a:avLst/>
@@ -8530,10 +9199,10 @@
       </p:pic>
       <p:sp>
         <p:nvSpPr>
-          <p:cNvPr id="7" name="Slide Number Placeholder 6">
-            <a:extLst>
-              <a:ext uri="{FF2B5EF4-FFF2-40B4-BE49-F238E27FC236}">
-                <a16:creationId xmlns:a16="http://schemas.microsoft.com/office/drawing/2014/main" id="{85DD50E0-E043-4D69-8F26-70A4F725ACD6}"/>
+          <p:cNvPr id="6" name="Slide Number Placeholder 5">
+            <a:extLst>
+              <a:ext uri="{FF2B5EF4-FFF2-40B4-BE49-F238E27FC236}">
+                <a16:creationId xmlns:a16="http://schemas.microsoft.com/office/drawing/2014/main" id="{BDA30B9E-62AD-45FD-BE07-5048F739080B}"/>
               </a:ext>
             </a:extLst>
           </p:cNvPr>
@@ -8560,7 +9229,7 @@
     </p:spTree>
     <p:extLst>
       <p:ext uri="{BB962C8B-B14F-4D97-AF65-F5344CB8AC3E}">
-        <p14:creationId xmlns:p14="http://schemas.microsoft.com/office/powerpoint/2010/main" val="2259787373"/>
+        <p14:creationId xmlns:p14="http://schemas.microsoft.com/office/powerpoint/2010/main" val="331830905"/>
       </p:ext>
     </p:extLst>
   </p:cSld>
@@ -8587,78 +9256,12 @@
           <a:chExt cx="0" cy="0"/>
         </a:xfrm>
       </p:grpSpPr>
-      <p:sp>
-        <p:nvSpPr>
-          <p:cNvPr id="2" name="Title 1">
-            <a:extLst>
-              <a:ext uri="{FF2B5EF4-FFF2-40B4-BE49-F238E27FC236}">
-                <a16:creationId xmlns:a16="http://schemas.microsoft.com/office/drawing/2014/main" id="{35E2AE60-011F-4352-822F-2BD9EC90D389}"/>
-              </a:ext>
-            </a:extLst>
-          </p:cNvPr>
-          <p:cNvSpPr>
-            <a:spLocks noGrp="1"/>
-          </p:cNvSpPr>
-          <p:nvPr>
-            <p:ph type="title"/>
-          </p:nvPr>
-        </p:nvSpPr>
-        <p:spPr/>
-        <p:txBody>
-          <a:bodyPr/>
-          <a:lstStyle/>
-          <a:p>
-            <a:r>
-              <a:rPr lang="tr-TR" dirty="0"/>
-              <a:t>DAO </a:t>
-            </a:r>
-            <a:r>
-              <a:rPr lang="en-US" dirty="0"/>
-              <a:t>M</a:t>
-            </a:r>
-            <a:r>
-              <a:rPr lang="tr-TR" dirty="0"/>
-              <a:t>a</a:t>
-            </a:r>
-            <a:r>
-              <a:rPr lang="en-US" dirty="0" err="1"/>
-              <a:t>ps</a:t>
-            </a:r>
-            <a:endParaRPr lang="tr-TR" dirty="0"/>
-          </a:p>
-        </p:txBody>
-      </p:sp>
-      <p:sp>
-        <p:nvSpPr>
-          <p:cNvPr id="3" name="Content Placeholder 2">
-            <a:extLst>
-              <a:ext uri="{FF2B5EF4-FFF2-40B4-BE49-F238E27FC236}">
-                <a16:creationId xmlns:a16="http://schemas.microsoft.com/office/drawing/2014/main" id="{5CE2662C-CE6A-4D20-AB4A-136CBE1F5A9D}"/>
-              </a:ext>
-            </a:extLst>
-          </p:cNvPr>
-          <p:cNvSpPr>
-            <a:spLocks noGrp="1"/>
-          </p:cNvSpPr>
-          <p:nvPr>
-            <p:ph idx="1"/>
-          </p:nvPr>
-        </p:nvSpPr>
-        <p:spPr/>
-        <p:txBody>
-          <a:bodyPr/>
-          <a:lstStyle/>
-          <a:p>
-            <a:endParaRPr lang="tr-TR"/>
-          </a:p>
-        </p:txBody>
-      </p:sp>
       <p:pic>
         <p:nvPicPr>
-          <p:cNvPr id="4" name="Picture 3">
-            <a:extLst>
-              <a:ext uri="{FF2B5EF4-FFF2-40B4-BE49-F238E27FC236}">
-                <a16:creationId xmlns:a16="http://schemas.microsoft.com/office/drawing/2014/main" id="{FBA4A2CF-269B-4E25-8D32-3D9F9E8A35E5}"/>
+          <p:cNvPr id="5" name="Picture 4">
+            <a:extLst>
+              <a:ext uri="{FF2B5EF4-FFF2-40B4-BE49-F238E27FC236}">
+                <a16:creationId xmlns:a16="http://schemas.microsoft.com/office/drawing/2014/main" id="{757100F0-5E17-4E28-803F-0E8C9C4EB101}"/>
               </a:ext>
             </a:extLst>
           </p:cNvPr>
@@ -8675,8 +9278,8 @@
         </p:blipFill>
         <p:spPr>
           <a:xfrm>
-            <a:off x="4679977" y="615635"/>
-            <a:ext cx="5809028" cy="5753477"/>
+            <a:off x="5188347" y="2477771"/>
+            <a:ext cx="6165453" cy="4015104"/>
           </a:xfrm>
           <a:prstGeom prst="rect">
             <a:avLst/>
@@ -8685,10 +9288,107 @@
       </p:pic>
       <p:sp>
         <p:nvSpPr>
-          <p:cNvPr id="5" name="Slide Number Placeholder 4">
-            <a:extLst>
-              <a:ext uri="{FF2B5EF4-FFF2-40B4-BE49-F238E27FC236}">
-                <a16:creationId xmlns:a16="http://schemas.microsoft.com/office/drawing/2014/main" id="{4AC47E1E-ABA9-4577-9E2E-474CBFFE349C}"/>
+          <p:cNvPr id="2" name="Title 1">
+            <a:extLst>
+              <a:ext uri="{FF2B5EF4-FFF2-40B4-BE49-F238E27FC236}">
+                <a16:creationId xmlns:a16="http://schemas.microsoft.com/office/drawing/2014/main" id="{89B09484-B546-4A48-A641-AE095CE085D8}"/>
+              </a:ext>
+            </a:extLst>
+          </p:cNvPr>
+          <p:cNvSpPr>
+            <a:spLocks noGrp="1"/>
+          </p:cNvSpPr>
+          <p:nvPr>
+            <p:ph type="title"/>
+          </p:nvPr>
+        </p:nvSpPr>
+        <p:spPr/>
+        <p:txBody>
+          <a:bodyPr/>
+          <a:lstStyle/>
+          <a:p>
+            <a:r>
+              <a:rPr lang="en-US" dirty="0"/>
+              <a:t>Comparison of A* and CBS</a:t>
+            </a:r>
+            <a:endParaRPr lang="tr-TR" dirty="0"/>
+          </a:p>
+        </p:txBody>
+      </p:sp>
+      <p:sp>
+        <p:nvSpPr>
+          <p:cNvPr id="3" name="Content Placeholder 2">
+            <a:extLst>
+              <a:ext uri="{FF2B5EF4-FFF2-40B4-BE49-F238E27FC236}">
+                <a16:creationId xmlns:a16="http://schemas.microsoft.com/office/drawing/2014/main" id="{F6858EBE-EF96-4AC4-A5D7-17D1FD4BF7FD}"/>
+              </a:ext>
+            </a:extLst>
+          </p:cNvPr>
+          <p:cNvSpPr>
+            <a:spLocks noGrp="1"/>
+          </p:cNvSpPr>
+          <p:nvPr>
+            <p:ph idx="1"/>
+          </p:nvPr>
+        </p:nvSpPr>
+        <p:spPr/>
+        <p:txBody>
+          <a:bodyPr/>
+          <a:lstStyle/>
+          <a:p>
+            <a:r>
+              <a:rPr lang="en-US" dirty="0"/>
+              <a:t>CBS will expand 8 + 4 · 4 + 6 · 5 = 54 low level nodes</a:t>
+            </a:r>
+          </a:p>
+          <a:p>
+            <a:r>
+              <a:rPr lang="en-US" dirty="0"/>
+              <a:t>A* will expand 5 + 3 = 8 nodes</a:t>
+            </a:r>
+            <a:endParaRPr lang="tr-TR" dirty="0"/>
+          </a:p>
+          <a:p>
+            <a:endParaRPr lang="tr-TR" dirty="0"/>
+          </a:p>
+        </p:txBody>
+      </p:sp>
+      <p:pic>
+        <p:nvPicPr>
+          <p:cNvPr id="4" name="Picture 3">
+            <a:extLst>
+              <a:ext uri="{FF2B5EF4-FFF2-40B4-BE49-F238E27FC236}">
+                <a16:creationId xmlns:a16="http://schemas.microsoft.com/office/drawing/2014/main" id="{065B89E3-2C95-46D1-9747-451896B2E750}"/>
+              </a:ext>
+            </a:extLst>
+          </p:cNvPr>
+          <p:cNvPicPr>
+            <a:picLocks noChangeAspect="1"/>
+          </p:cNvPicPr>
+          <p:nvPr/>
+        </p:nvPicPr>
+        <p:blipFill>
+          <a:blip r:embed="rId4"/>
+          <a:stretch>
+            <a:fillRect/>
+          </a:stretch>
+        </p:blipFill>
+        <p:spPr>
+          <a:xfrm>
+            <a:off x="659779" y="3429000"/>
+            <a:ext cx="4244190" cy="2969696"/>
+          </a:xfrm>
+          <a:prstGeom prst="rect">
+            <a:avLst/>
+          </a:prstGeom>
+        </p:spPr>
+      </p:pic>
+      <p:sp>
+        <p:nvSpPr>
+          <p:cNvPr id="6" name="Slide Number Placeholder 5">
+            <a:extLst>
+              <a:ext uri="{FF2B5EF4-FFF2-40B4-BE49-F238E27FC236}">
+                <a16:creationId xmlns:a16="http://schemas.microsoft.com/office/drawing/2014/main" id="{BDA30B9E-62AD-45FD-BE07-5048F739080B}"/>
               </a:ext>
             </a:extLst>
           </p:cNvPr>
@@ -8715,7 +9415,7 @@
     </p:spTree>
     <p:extLst>
       <p:ext uri="{BB962C8B-B14F-4D97-AF65-F5344CB8AC3E}">
-        <p14:creationId xmlns:p14="http://schemas.microsoft.com/office/powerpoint/2010/main" val="3042818153"/>
+        <p14:creationId xmlns:p14="http://schemas.microsoft.com/office/powerpoint/2010/main" val="3794345981"/>
       </p:ext>
     </p:extLst>
   </p:cSld>
@@ -8747,7 +9447,7 @@
           <p:cNvPr id="2" name="Title 1">
             <a:extLst>
               <a:ext uri="{FF2B5EF4-FFF2-40B4-BE49-F238E27FC236}">
-                <a16:creationId xmlns:a16="http://schemas.microsoft.com/office/drawing/2014/main" id="{0C767491-8677-470F-AFE3-97D113884554}"/>
+                <a16:creationId xmlns:a16="http://schemas.microsoft.com/office/drawing/2014/main" id="{FD61823E-C56F-41DB-B07A-BC9DC0F39708}"/>
               </a:ext>
             </a:extLst>
           </p:cNvPr>
@@ -8765,7 +9465,7 @@
           <a:p>
             <a:r>
               <a:rPr lang="en-US" dirty="0"/>
-              <a:t>MA-CBS (Meta-agent Conflict-based Search)</a:t>
+              <a:t>8x8 Grid</a:t>
             </a:r>
             <a:endParaRPr lang="tr-TR" dirty="0"/>
           </a:p>
@@ -8776,7 +9476,7 @@
           <p:cNvPr id="3" name="Content Placeholder 2">
             <a:extLst>
               <a:ext uri="{FF2B5EF4-FFF2-40B4-BE49-F238E27FC236}">
-                <a16:creationId xmlns:a16="http://schemas.microsoft.com/office/drawing/2014/main" id="{0E2479E4-39A3-4E1B-99F0-A6B7033968D2}"/>
+                <a16:creationId xmlns:a16="http://schemas.microsoft.com/office/drawing/2014/main" id="{DB249683-9EF3-4C21-8B07-4A9D6644FDD3}"/>
               </a:ext>
             </a:extLst>
           </p:cNvPr>
@@ -8792,45 +9492,76 @@
           <a:bodyPr/>
           <a:lstStyle/>
           <a:p>
-            <a:r>
-              <a:rPr lang="en-US" dirty="0"/>
-              <a:t>Remedies poor behavior of CBS when a set of agents is frequently conflicting by automatically merging those agent into a meta agent</a:t>
-            </a:r>
-          </a:p>
-          <a:p>
-            <a:r>
-              <a:rPr lang="en-US" dirty="0"/>
-              <a:t>Therefore prevent the exponential growth of constraint tree</a:t>
-            </a:r>
-          </a:p>
-          <a:p>
-            <a:r>
-              <a:rPr lang="en-US" dirty="0"/>
-              <a:t>Important Concepts with this:</a:t>
-            </a:r>
-          </a:p>
-          <a:p>
-            <a:pPr lvl="1"/>
-            <a:r>
-              <a:rPr lang="en-US" dirty="0"/>
-              <a:t>Merge policy</a:t>
-            </a:r>
-          </a:p>
-          <a:p>
-            <a:pPr lvl="1"/>
-            <a:r>
-              <a:rPr lang="en-US" dirty="0"/>
-              <a:t>Merging constraints</a:t>
-            </a:r>
-          </a:p>
-        </p:txBody>
-      </p:sp>
-      <p:sp>
-        <p:nvSpPr>
-          <p:cNvPr id="4" name="Slide Number Placeholder 3">
-            <a:extLst>
-              <a:ext uri="{FF2B5EF4-FFF2-40B4-BE49-F238E27FC236}">
-                <a16:creationId xmlns:a16="http://schemas.microsoft.com/office/drawing/2014/main" id="{F445A021-F867-4958-AFB7-029E498DDBED}"/>
+            <a:endParaRPr lang="tr-TR" dirty="0"/>
+          </a:p>
+        </p:txBody>
+      </p:sp>
+      <p:pic>
+        <p:nvPicPr>
+          <p:cNvPr id="4" name="Picture 3">
+            <a:extLst>
+              <a:ext uri="{FF2B5EF4-FFF2-40B4-BE49-F238E27FC236}">
+                <a16:creationId xmlns:a16="http://schemas.microsoft.com/office/drawing/2014/main" id="{6AC9BC14-FB3F-4B54-BE46-BD55BB0F91D5}"/>
+              </a:ext>
+            </a:extLst>
+          </p:cNvPr>
+          <p:cNvPicPr>
+            <a:picLocks noChangeAspect="1"/>
+          </p:cNvPicPr>
+          <p:nvPr/>
+        </p:nvPicPr>
+        <p:blipFill>
+          <a:blip r:embed="rId3"/>
+          <a:stretch>
+            <a:fillRect/>
+          </a:stretch>
+        </p:blipFill>
+        <p:spPr>
+          <a:xfrm>
+            <a:off x="6850454" y="585008"/>
+            <a:ext cx="4610743" cy="2629267"/>
+          </a:xfrm>
+          <a:prstGeom prst="rect">
+            <a:avLst/>
+          </a:prstGeom>
+        </p:spPr>
+      </p:pic>
+      <p:pic>
+        <p:nvPicPr>
+          <p:cNvPr id="6" name="Picture 5">
+            <a:extLst>
+              <a:ext uri="{FF2B5EF4-FFF2-40B4-BE49-F238E27FC236}">
+                <a16:creationId xmlns:a16="http://schemas.microsoft.com/office/drawing/2014/main" id="{C34A203A-3BE4-4066-A79F-0D5C5D20AC52}"/>
+              </a:ext>
+            </a:extLst>
+          </p:cNvPr>
+          <p:cNvPicPr>
+            <a:picLocks noChangeAspect="1"/>
+          </p:cNvPicPr>
+          <p:nvPr/>
+        </p:nvPicPr>
+        <p:blipFill>
+          <a:blip r:embed="rId4"/>
+          <a:stretch>
+            <a:fillRect/>
+          </a:stretch>
+        </p:blipFill>
+        <p:spPr>
+          <a:xfrm>
+            <a:off x="448761" y="3310304"/>
+            <a:ext cx="8707065" cy="2962688"/>
+          </a:xfrm>
+          <a:prstGeom prst="rect">
+            <a:avLst/>
+          </a:prstGeom>
+        </p:spPr>
+      </p:pic>
+      <p:sp>
+        <p:nvSpPr>
+          <p:cNvPr id="7" name="Slide Number Placeholder 6">
+            <a:extLst>
+              <a:ext uri="{FF2B5EF4-FFF2-40B4-BE49-F238E27FC236}">
+                <a16:creationId xmlns:a16="http://schemas.microsoft.com/office/drawing/2014/main" id="{85DD50E0-E043-4D69-8F26-70A4F725ACD6}"/>
               </a:ext>
             </a:extLst>
           </p:cNvPr>
@@ -8857,7 +9588,7 @@
     </p:spTree>
     <p:extLst>
       <p:ext uri="{BB962C8B-B14F-4D97-AF65-F5344CB8AC3E}">
-        <p14:creationId xmlns:p14="http://schemas.microsoft.com/office/powerpoint/2010/main" val="63228646"/>
+        <p14:creationId xmlns:p14="http://schemas.microsoft.com/office/powerpoint/2010/main" val="2259787373"/>
       </p:ext>
     </p:extLst>
   </p:cSld>
@@ -8889,7 +9620,7 @@
           <p:cNvPr id="2" name="Title 1">
             <a:extLst>
               <a:ext uri="{FF2B5EF4-FFF2-40B4-BE49-F238E27FC236}">
-                <a16:creationId xmlns:a16="http://schemas.microsoft.com/office/drawing/2014/main" id="{34CA8524-95F4-4051-B51C-462CE88A4FAF}"/>
+                <a16:creationId xmlns:a16="http://schemas.microsoft.com/office/drawing/2014/main" id="{35E2AE60-011F-4352-822F-2BD9EC90D389}"/>
               </a:ext>
             </a:extLst>
           </p:cNvPr>
@@ -8905,16 +9636,313 @@
           <a:bodyPr/>
           <a:lstStyle/>
           <a:p>
+            <a:r>
+              <a:rPr lang="tr-TR" dirty="0"/>
+              <a:t>DAO </a:t>
+            </a:r>
+            <a:r>
+              <a:rPr lang="en-US" dirty="0"/>
+              <a:t>M</a:t>
+            </a:r>
+            <a:r>
+              <a:rPr lang="tr-TR" dirty="0"/>
+              <a:t>a</a:t>
+            </a:r>
+            <a:r>
+              <a:rPr lang="en-US" dirty="0" err="1"/>
+              <a:t>ps</a:t>
+            </a:r>
+            <a:endParaRPr lang="tr-TR" dirty="0"/>
+          </a:p>
+        </p:txBody>
+      </p:sp>
+      <p:sp>
+        <p:nvSpPr>
+          <p:cNvPr id="3" name="Content Placeholder 2">
+            <a:extLst>
+              <a:ext uri="{FF2B5EF4-FFF2-40B4-BE49-F238E27FC236}">
+                <a16:creationId xmlns:a16="http://schemas.microsoft.com/office/drawing/2014/main" id="{5CE2662C-CE6A-4D20-AB4A-136CBE1F5A9D}"/>
+              </a:ext>
+            </a:extLst>
+          </p:cNvPr>
+          <p:cNvSpPr>
+            <a:spLocks noGrp="1"/>
+          </p:cNvSpPr>
+          <p:nvPr>
+            <p:ph idx="1"/>
+          </p:nvPr>
+        </p:nvSpPr>
+        <p:spPr/>
+        <p:txBody>
+          <a:bodyPr/>
+          <a:lstStyle/>
+          <a:p>
+            <a:endParaRPr lang="tr-TR"/>
+          </a:p>
+        </p:txBody>
+      </p:sp>
+      <p:pic>
+        <p:nvPicPr>
+          <p:cNvPr id="4" name="Picture 3">
+            <a:extLst>
+              <a:ext uri="{FF2B5EF4-FFF2-40B4-BE49-F238E27FC236}">
+                <a16:creationId xmlns:a16="http://schemas.microsoft.com/office/drawing/2014/main" id="{FBA4A2CF-269B-4E25-8D32-3D9F9E8A35E5}"/>
+              </a:ext>
+            </a:extLst>
+          </p:cNvPr>
+          <p:cNvPicPr>
+            <a:picLocks noChangeAspect="1"/>
+          </p:cNvPicPr>
+          <p:nvPr/>
+        </p:nvPicPr>
+        <p:blipFill>
+          <a:blip r:embed="rId3"/>
+          <a:stretch>
+            <a:fillRect/>
+          </a:stretch>
+        </p:blipFill>
+        <p:spPr>
+          <a:xfrm>
+            <a:off x="4679977" y="615635"/>
+            <a:ext cx="5809028" cy="5753477"/>
+          </a:xfrm>
+          <a:prstGeom prst="rect">
+            <a:avLst/>
+          </a:prstGeom>
+        </p:spPr>
+      </p:pic>
+      <p:sp>
+        <p:nvSpPr>
+          <p:cNvPr id="5" name="Slide Number Placeholder 4">
+            <a:extLst>
+              <a:ext uri="{FF2B5EF4-FFF2-40B4-BE49-F238E27FC236}">
+                <a16:creationId xmlns:a16="http://schemas.microsoft.com/office/drawing/2014/main" id="{4AC47E1E-ABA9-4577-9E2E-474CBFFE349C}"/>
+              </a:ext>
+            </a:extLst>
+          </p:cNvPr>
+          <p:cNvSpPr>
+            <a:spLocks noGrp="1"/>
+          </p:cNvSpPr>
+          <p:nvPr>
+            <p:ph type="sldNum" sz="quarter" idx="12"/>
+          </p:nvPr>
+        </p:nvSpPr>
+        <p:spPr/>
+        <p:txBody>
+          <a:bodyPr/>
+          <a:lstStyle/>
+          <a:p>
+            <a:fld id="{4B024B25-DFCA-4944-BA90-A17C573440F7}" type="slidenum">
+              <a:rPr lang="tr-TR" smtClean="0"/>
+              <a:t>17</a:t>
+            </a:fld>
+            <a:endParaRPr lang="tr-TR"/>
+          </a:p>
+        </p:txBody>
+      </p:sp>
+    </p:spTree>
+    <p:extLst>
+      <p:ext uri="{BB962C8B-B14F-4D97-AF65-F5344CB8AC3E}">
+        <p14:creationId xmlns:p14="http://schemas.microsoft.com/office/powerpoint/2010/main" val="3042818153"/>
+      </p:ext>
+    </p:extLst>
+  </p:cSld>
+  <p:clrMapOvr>
+    <a:masterClrMapping/>
+  </p:clrMapOvr>
+</p:sld>
+</file>
+
+<file path=ppt/slides/slide18.xml><?xml version="1.0" encoding="utf-8"?>
+<p:sld xmlns:a="http://schemas.openxmlformats.org/drawingml/2006/main" xmlns:r="http://schemas.openxmlformats.org/officeDocument/2006/relationships" xmlns:p="http://schemas.openxmlformats.org/presentationml/2006/main">
+  <p:cSld>
+    <p:spTree>
+      <p:nvGrpSpPr>
+        <p:cNvPr id="1" name=""/>
+        <p:cNvGrpSpPr/>
+        <p:nvPr/>
+      </p:nvGrpSpPr>
+      <p:grpSpPr>
+        <a:xfrm>
+          <a:off x="0" y="0"/>
+          <a:ext cx="0" cy="0"/>
+          <a:chOff x="0" y="0"/>
+          <a:chExt cx="0" cy="0"/>
+        </a:xfrm>
+      </p:grpSpPr>
+      <p:sp>
+        <p:nvSpPr>
+          <p:cNvPr id="2" name="Title 1">
+            <a:extLst>
+              <a:ext uri="{FF2B5EF4-FFF2-40B4-BE49-F238E27FC236}">
+                <a16:creationId xmlns:a16="http://schemas.microsoft.com/office/drawing/2014/main" id="{0C767491-8677-470F-AFE3-97D113884554}"/>
+              </a:ext>
+            </a:extLst>
+          </p:cNvPr>
+          <p:cNvSpPr>
+            <a:spLocks noGrp="1"/>
+          </p:cNvSpPr>
+          <p:nvPr>
+            <p:ph type="title"/>
+          </p:nvPr>
+        </p:nvSpPr>
+        <p:spPr/>
+        <p:txBody>
+          <a:bodyPr/>
+          <a:lstStyle/>
+          <a:p>
+            <a:r>
+              <a:rPr lang="en-US" dirty="0"/>
+              <a:t>MA-CBS (Meta-agent Conflict-based Search)</a:t>
+            </a:r>
+            <a:endParaRPr lang="tr-TR" dirty="0"/>
+          </a:p>
+        </p:txBody>
+      </p:sp>
+      <p:sp>
+        <p:nvSpPr>
+          <p:cNvPr id="3" name="Content Placeholder 2">
+            <a:extLst>
+              <a:ext uri="{FF2B5EF4-FFF2-40B4-BE49-F238E27FC236}">
+                <a16:creationId xmlns:a16="http://schemas.microsoft.com/office/drawing/2014/main" id="{0E2479E4-39A3-4E1B-99F0-A6B7033968D2}"/>
+              </a:ext>
+            </a:extLst>
+          </p:cNvPr>
+          <p:cNvSpPr>
+            <a:spLocks noGrp="1"/>
+          </p:cNvSpPr>
+          <p:nvPr>
+            <p:ph idx="1"/>
+          </p:nvPr>
+        </p:nvSpPr>
+        <p:spPr/>
+        <p:txBody>
+          <a:bodyPr/>
+          <a:lstStyle/>
+          <a:p>
+            <a:r>
+              <a:rPr lang="en-US" dirty="0"/>
+              <a:t>Remedies poor behavior of CBS when a set of agents is frequently conflicting by automatically merging those agent into a meta agent</a:t>
+            </a:r>
+          </a:p>
+          <a:p>
+            <a:r>
+              <a:rPr lang="en-US" dirty="0"/>
+              <a:t>Therefore prevent the exponential growth of constraint tree</a:t>
+            </a:r>
+          </a:p>
+          <a:p>
+            <a:r>
+              <a:rPr lang="en-US" dirty="0"/>
+              <a:t>Important Concepts with this:</a:t>
+            </a:r>
+          </a:p>
+          <a:p>
+            <a:pPr lvl="1"/>
             <a:r>
               <a:rPr lang="en-US" dirty="0"/>
               <a:t>Merge policy</a:t>
             </a:r>
+          </a:p>
+          <a:p>
+            <a:pPr lvl="1"/>
+            <a:r>
+              <a:rPr lang="en-US" dirty="0"/>
+              <a:t>Merging constraints</a:t>
+            </a:r>
+          </a:p>
+        </p:txBody>
+      </p:sp>
+      <p:sp>
+        <p:nvSpPr>
+          <p:cNvPr id="4" name="Slide Number Placeholder 3">
+            <a:extLst>
+              <a:ext uri="{FF2B5EF4-FFF2-40B4-BE49-F238E27FC236}">
+                <a16:creationId xmlns:a16="http://schemas.microsoft.com/office/drawing/2014/main" id="{F445A021-F867-4958-AFB7-029E498DDBED}"/>
+              </a:ext>
+            </a:extLst>
+          </p:cNvPr>
+          <p:cNvSpPr>
+            <a:spLocks noGrp="1"/>
+          </p:cNvSpPr>
+          <p:nvPr>
+            <p:ph type="sldNum" sz="quarter" idx="12"/>
+          </p:nvPr>
+        </p:nvSpPr>
+        <p:spPr/>
+        <p:txBody>
+          <a:bodyPr/>
+          <a:lstStyle/>
+          <a:p>
+            <a:fld id="{4B024B25-DFCA-4944-BA90-A17C573440F7}" type="slidenum">
+              <a:rPr lang="tr-TR" smtClean="0"/>
+              <a:t>18</a:t>
+            </a:fld>
+            <a:endParaRPr lang="tr-TR"/>
+          </a:p>
+        </p:txBody>
+      </p:sp>
+    </p:spTree>
+    <p:extLst>
+      <p:ext uri="{BB962C8B-B14F-4D97-AF65-F5344CB8AC3E}">
+        <p14:creationId xmlns:p14="http://schemas.microsoft.com/office/powerpoint/2010/main" val="63228646"/>
+      </p:ext>
+    </p:extLst>
+  </p:cSld>
+  <p:clrMapOvr>
+    <a:masterClrMapping/>
+  </p:clrMapOvr>
+</p:sld>
+</file>
+
+<file path=ppt/slides/slide19.xml><?xml version="1.0" encoding="utf-8"?>
+<p:sld xmlns:a="http://schemas.openxmlformats.org/drawingml/2006/main" xmlns:r="http://schemas.openxmlformats.org/officeDocument/2006/relationships" xmlns:p="http://schemas.openxmlformats.org/presentationml/2006/main">
+  <p:cSld>
+    <p:spTree>
+      <p:nvGrpSpPr>
+        <p:cNvPr id="1" name=""/>
+        <p:cNvGrpSpPr/>
+        <p:nvPr/>
+      </p:nvGrpSpPr>
+      <p:grpSpPr>
+        <a:xfrm>
+          <a:off x="0" y="0"/>
+          <a:ext cx="0" cy="0"/>
+          <a:chOff x="0" y="0"/>
+          <a:chExt cx="0" cy="0"/>
+        </a:xfrm>
+      </p:grpSpPr>
+      <p:sp>
+        <p:nvSpPr>
+          <p:cNvPr id="2" name="Title 1">
+            <a:extLst>
+              <a:ext uri="{FF2B5EF4-FFF2-40B4-BE49-F238E27FC236}">
+                <a16:creationId xmlns:a16="http://schemas.microsoft.com/office/drawing/2014/main" id="{34CA8524-95F4-4051-B51C-462CE88A4FAF}"/>
+              </a:ext>
+            </a:extLst>
+          </p:cNvPr>
+          <p:cNvSpPr>
+            <a:spLocks noGrp="1"/>
+          </p:cNvSpPr>
+          <p:nvPr>
+            <p:ph type="title"/>
+          </p:nvPr>
+        </p:nvSpPr>
+        <p:spPr/>
+        <p:txBody>
+          <a:bodyPr/>
+          <a:lstStyle/>
+          <a:p>
+            <a:r>
+              <a:rPr lang="en-US" dirty="0"/>
+              <a:t>Merge policy</a:t>
+            </a:r>
             <a:endParaRPr lang="tr-TR" dirty="0"/>
           </a:p>
         </p:txBody>
       </p:sp>
-      <mc:AlternateContent xmlns:mc="http://schemas.openxmlformats.org/markup-compatibility/2006" xmlns:a14="http://schemas.microsoft.com/office/drawing/2010/main">
-        <mc:Choice Requires="a14">
+      <mc:AlternateContent xmlns:mc="http://schemas.openxmlformats.org/markup-compatibility/2006">
+        <mc:Choice xmlns:a14="http://schemas.microsoft.com/office/drawing/2010/main" Requires="a14">
           <p:sp>
             <p:nvSpPr>
               <p:cNvPr id="3" name="Content Placeholder 2">
@@ -9183,10 +10211,71 @@
                   <a:t>d by MA-CBS(B)</a:t>
                 </a:r>
               </a:p>
+              <a:p>
+                <a:r>
+                  <a:rPr lang="en-US" dirty="0"/>
+                  <a:t>MA-CBS(</a:t>
+                </a:r>
+                <a14:m>
+                  <m:oMath xmlns:m="http://schemas.openxmlformats.org/officeDocument/2006/math">
+                    <m:r>
+                      <a:rPr lang="en-US" i="1" smtClean="0">
+                        <a:latin typeface="Cambria Math" panose="02040503050406030204" pitchFamily="18" charset="0"/>
+                        <a:ea typeface="Cambria Math" panose="02040503050406030204" pitchFamily="18" charset="0"/>
+                      </a:rPr>
+                      <m:t>∞</m:t>
+                    </m:r>
+                  </m:oMath>
+                </a14:m>
+                <a:r>
+                  <a:rPr lang="en-US" dirty="0"/>
+                  <a:t>) equal to basic CBS</a:t>
+                </a:r>
+              </a:p>
+              <a:p>
+                <a:r>
+                  <a:rPr lang="en-US" dirty="0"/>
+                  <a:t>MA-CBS(</a:t>
+                </a:r>
+                <a14:m>
+                  <m:oMath xmlns:m="http://schemas.openxmlformats.org/officeDocument/2006/math">
+                    <m:r>
+                      <a:rPr lang="en-US" b="0" i="1" smtClean="0">
+                        <a:latin typeface="Cambria Math" panose="02040503050406030204" pitchFamily="18" charset="0"/>
+                      </a:rPr>
+                      <m:t>0</m:t>
+                    </m:r>
+                  </m:oMath>
+                </a14:m>
+                <a:r>
+                  <a:rPr lang="en-US" dirty="0"/>
+                  <a:t>) equal to basic ID</a:t>
+                </a:r>
+              </a:p>
+              <a:p>
+                <a:r>
+                  <a:rPr lang="en-US" dirty="0"/>
+                  <a:t>MA-CBS(</a:t>
+                </a:r>
+                <a14:m>
+                  <m:oMath xmlns:m="http://schemas.openxmlformats.org/officeDocument/2006/math">
+                    <m:r>
+                      <a:rPr lang="en-US" b="0" i="1" smtClean="0">
+                        <a:latin typeface="Cambria Math" panose="02040503050406030204" pitchFamily="18" charset="0"/>
+                      </a:rPr>
+                      <m:t>1</m:t>
+                    </m:r>
+                  </m:oMath>
+                </a14:m>
+                <a:r>
+                  <a:rPr lang="en-US" dirty="0"/>
+                  <a:t>) equal to basic Enhancements to ID</a:t>
+                </a:r>
+              </a:p>
             </p:txBody>
           </p:sp>
         </mc:Choice>
-        <mc:Fallback xmlns="">
+        <mc:Fallback>
           <p:sp>
             <p:nvSpPr>
               <p:cNvPr id="3" name="Content Placeholder 2">
@@ -9249,7 +10338,7 @@
           <a:p>
             <a:fld id="{4B024B25-DFCA-4944-BA90-A17C573440F7}" type="slidenum">
               <a:rPr lang="tr-TR" smtClean="0"/>
-              <a:t>17</a:t>
+              <a:t>19</a:t>
             </a:fld>
             <a:endParaRPr lang="tr-TR"/>
           </a:p>
@@ -9268,7 +10357,225 @@
 </p:sld>
 </file>
 
-<file path=ppt/slides/slide18.xml><?xml version="1.0" encoding="utf-8"?>
+<file path=ppt/slides/slide2.xml><?xml version="1.0" encoding="utf-8"?>
+<p:sld xmlns:a="http://schemas.openxmlformats.org/drawingml/2006/main" xmlns:r="http://schemas.openxmlformats.org/officeDocument/2006/relationships" xmlns:p="http://schemas.openxmlformats.org/presentationml/2006/main">
+  <p:cSld>
+    <p:spTree>
+      <p:nvGrpSpPr>
+        <p:cNvPr id="1" name=""/>
+        <p:cNvGrpSpPr/>
+        <p:nvPr/>
+      </p:nvGrpSpPr>
+      <p:grpSpPr>
+        <a:xfrm>
+          <a:off x="0" y="0"/>
+          <a:ext cx="0" cy="0"/>
+          <a:chOff x="0" y="0"/>
+          <a:chExt cx="0" cy="0"/>
+        </a:xfrm>
+      </p:grpSpPr>
+      <p:sp>
+        <p:nvSpPr>
+          <p:cNvPr id="2" name="Title 1">
+            <a:extLst>
+              <a:ext uri="{FF2B5EF4-FFF2-40B4-BE49-F238E27FC236}">
+                <a16:creationId xmlns:a16="http://schemas.microsoft.com/office/drawing/2014/main" id="{435A02C8-731E-48B1-AF23-074D244513DC}"/>
+              </a:ext>
+            </a:extLst>
+          </p:cNvPr>
+          <p:cNvSpPr>
+            <a:spLocks noGrp="1"/>
+          </p:cNvSpPr>
+          <p:nvPr>
+            <p:ph type="title"/>
+          </p:nvPr>
+        </p:nvSpPr>
+        <p:spPr/>
+        <p:txBody>
+          <a:bodyPr/>
+          <a:lstStyle/>
+          <a:p>
+            <a:r>
+              <a:rPr lang="en-US" dirty="0"/>
+              <a:t>Index</a:t>
+            </a:r>
+            <a:endParaRPr lang="tr-TR" dirty="0"/>
+          </a:p>
+        </p:txBody>
+      </p:sp>
+      <p:sp>
+        <p:nvSpPr>
+          <p:cNvPr id="3" name="Content Placeholder 2">
+            <a:extLst>
+              <a:ext uri="{FF2B5EF4-FFF2-40B4-BE49-F238E27FC236}">
+                <a16:creationId xmlns:a16="http://schemas.microsoft.com/office/drawing/2014/main" id="{64A8D04E-8231-4EB8-8A57-4762885D2BAB}"/>
+              </a:ext>
+            </a:extLst>
+          </p:cNvPr>
+          <p:cNvSpPr>
+            <a:spLocks noGrp="1"/>
+          </p:cNvSpPr>
+          <p:nvPr>
+            <p:ph idx="1"/>
+          </p:nvPr>
+        </p:nvSpPr>
+        <p:spPr/>
+        <p:txBody>
+          <a:bodyPr>
+            <a:normAutofit fontScale="85000" lnSpcReduction="20000"/>
+          </a:bodyPr>
+          <a:lstStyle/>
+          <a:p>
+            <a:r>
+              <a:rPr lang="en-US" dirty="0"/>
+              <a:t>A*</a:t>
+            </a:r>
+          </a:p>
+          <a:p>
+            <a:r>
+              <a:rPr lang="en-US" dirty="0"/>
+              <a:t>CBS (Conflict-based Search)</a:t>
+            </a:r>
+          </a:p>
+          <a:p>
+            <a:pPr lvl="1"/>
+            <a:r>
+              <a:rPr lang="en-US" dirty="0"/>
+              <a:t>High-level</a:t>
+            </a:r>
+          </a:p>
+          <a:p>
+            <a:pPr lvl="1"/>
+            <a:r>
+              <a:rPr lang="en-US" dirty="0"/>
+              <a:t>Low-level</a:t>
+            </a:r>
+          </a:p>
+          <a:p>
+            <a:pPr lvl="1"/>
+            <a:r>
+              <a:rPr lang="en-US" dirty="0"/>
+              <a:t>Comparison of A* and CBS</a:t>
+            </a:r>
+          </a:p>
+          <a:p>
+            <a:pPr lvl="1"/>
+            <a:r>
+              <a:rPr lang="en-US" dirty="0"/>
+              <a:t>Theorical Analysis of CBS</a:t>
+            </a:r>
+          </a:p>
+          <a:p>
+            <a:pPr lvl="1"/>
+            <a:r>
+              <a:rPr lang="en-US" dirty="0"/>
+              <a:t>Experimental results</a:t>
+            </a:r>
+          </a:p>
+          <a:p>
+            <a:r>
+              <a:rPr lang="en-US" dirty="0"/>
+              <a:t>MA-CBS (Meta-agent Conflict-based Search)</a:t>
+            </a:r>
+          </a:p>
+          <a:p>
+            <a:pPr lvl="1"/>
+            <a:r>
+              <a:rPr lang="en-US" dirty="0"/>
+              <a:t>Merge policy</a:t>
+            </a:r>
+          </a:p>
+          <a:p>
+            <a:pPr lvl="1"/>
+            <a:r>
+              <a:rPr lang="en-US" dirty="0"/>
+              <a:t>Merging constraints</a:t>
+            </a:r>
+          </a:p>
+          <a:p>
+            <a:pPr lvl="1"/>
+            <a:r>
+              <a:rPr lang="en-US" dirty="0"/>
+              <a:t>Low-level</a:t>
+            </a:r>
+          </a:p>
+          <a:p>
+            <a:pPr lvl="1"/>
+            <a:r>
+              <a:rPr lang="en-US" dirty="0"/>
+              <a:t>Experimental results</a:t>
+            </a:r>
+          </a:p>
+          <a:p>
+            <a:r>
+              <a:rPr lang="en-US" dirty="0"/>
+              <a:t>References</a:t>
+            </a:r>
+          </a:p>
+          <a:p>
+            <a:pPr lvl="1"/>
+            <a:endParaRPr lang="en-US" dirty="0"/>
+          </a:p>
+          <a:p>
+            <a:pPr lvl="1"/>
+            <a:endParaRPr lang="en-US" dirty="0"/>
+          </a:p>
+          <a:p>
+            <a:pPr lvl="1"/>
+            <a:endParaRPr lang="en-US" dirty="0"/>
+          </a:p>
+          <a:p>
+            <a:pPr lvl="1"/>
+            <a:endParaRPr lang="en-US" dirty="0"/>
+          </a:p>
+          <a:p>
+            <a:endParaRPr lang="tr-TR" dirty="0"/>
+          </a:p>
+        </p:txBody>
+      </p:sp>
+      <p:sp>
+        <p:nvSpPr>
+          <p:cNvPr id="4" name="Slide Number Placeholder 3">
+            <a:extLst>
+              <a:ext uri="{FF2B5EF4-FFF2-40B4-BE49-F238E27FC236}">
+                <a16:creationId xmlns:a16="http://schemas.microsoft.com/office/drawing/2014/main" id="{D300C1ED-E168-4022-B4DB-6C6974A4D5E6}"/>
+              </a:ext>
+            </a:extLst>
+          </p:cNvPr>
+          <p:cNvSpPr>
+            <a:spLocks noGrp="1"/>
+          </p:cNvSpPr>
+          <p:nvPr>
+            <p:ph type="sldNum" sz="quarter" idx="12"/>
+          </p:nvPr>
+        </p:nvSpPr>
+        <p:spPr/>
+        <p:txBody>
+          <a:bodyPr/>
+          <a:lstStyle/>
+          <a:p>
+            <a:fld id="{4B024B25-DFCA-4944-BA90-A17C573440F7}" type="slidenum">
+              <a:rPr lang="tr-TR" smtClean="0"/>
+              <a:t>2</a:t>
+            </a:fld>
+            <a:endParaRPr lang="tr-TR"/>
+          </a:p>
+        </p:txBody>
+      </p:sp>
+    </p:spTree>
+    <p:extLst>
+      <p:ext uri="{BB962C8B-B14F-4D97-AF65-F5344CB8AC3E}">
+        <p14:creationId xmlns:p14="http://schemas.microsoft.com/office/powerpoint/2010/main" val="990298044"/>
+      </p:ext>
+    </p:extLst>
+  </p:cSld>
+  <p:clrMapOvr>
+    <a:masterClrMapping/>
+  </p:clrMapOvr>
+</p:sld>
+</file>
+
+<file path=ppt/slides/slide20.xml><?xml version="1.0" encoding="utf-8"?>
 <p:sld xmlns:a="http://schemas.openxmlformats.org/drawingml/2006/main" xmlns:r="http://schemas.openxmlformats.org/officeDocument/2006/relationships" xmlns:p="http://schemas.openxmlformats.org/presentationml/2006/main">
   <p:cSld>
     <p:spTree>
@@ -9841,7 +11148,7 @@
           <a:p>
             <a:fld id="{4B024B25-DFCA-4944-BA90-A17C573440F7}" type="slidenum">
               <a:rPr lang="tr-TR" smtClean="0"/>
-              <a:t>18</a:t>
+              <a:t>20</a:t>
             </a:fld>
             <a:endParaRPr lang="tr-TR"/>
           </a:p>
@@ -9860,7 +11167,7 @@
 </p:sld>
 </file>
 
-<file path=ppt/slides/slide19.xml><?xml version="1.0" encoding="utf-8"?>
+<file path=ppt/slides/slide21.xml><?xml version="1.0" encoding="utf-8"?>
 <p:sld xmlns:a="http://schemas.openxmlformats.org/drawingml/2006/main" xmlns:r="http://schemas.openxmlformats.org/officeDocument/2006/relationships" xmlns:p="http://schemas.openxmlformats.org/presentationml/2006/main">
   <p:cSld>
     <p:spTree>
@@ -9929,7 +11236,7 @@
           <a:p>
             <a:r>
               <a:rPr lang="en-US" dirty="0"/>
-              <a:t>Completeness</a:t>
+              <a:t>Complete</a:t>
             </a:r>
           </a:p>
           <a:p>
@@ -9941,7 +11248,7 @@
           <a:p>
             <a:r>
               <a:rPr lang="en-US" dirty="0"/>
-              <a:t>Optimality</a:t>
+              <a:t>Optimal</a:t>
             </a:r>
           </a:p>
           <a:p>
@@ -9979,7 +11286,7 @@
           <a:p>
             <a:fld id="{4B024B25-DFCA-4944-BA90-A17C573440F7}" type="slidenum">
               <a:rPr lang="tr-TR" smtClean="0"/>
-              <a:t>19</a:t>
+              <a:t>21</a:t>
             </a:fld>
             <a:endParaRPr lang="tr-TR"/>
           </a:p>
@@ -9998,7 +11305,7 @@
 </p:sld>
 </file>
 
-<file path=ppt/slides/slide2.xml><?xml version="1.0" encoding="utf-8"?>
+<file path=ppt/slides/slide22.xml><?xml version="1.0" encoding="utf-8"?>
 <p:sld xmlns:a="http://schemas.openxmlformats.org/drawingml/2006/main" xmlns:r="http://schemas.openxmlformats.org/officeDocument/2006/relationships" xmlns:p="http://schemas.openxmlformats.org/presentationml/2006/main">
   <p:cSld>
     <p:spTree>
@@ -10020,224 +11327,6 @@
           <p:cNvPr id="2" name="Title 1">
             <a:extLst>
               <a:ext uri="{FF2B5EF4-FFF2-40B4-BE49-F238E27FC236}">
-                <a16:creationId xmlns:a16="http://schemas.microsoft.com/office/drawing/2014/main" id="{435A02C8-731E-48B1-AF23-074D244513DC}"/>
-              </a:ext>
-            </a:extLst>
-          </p:cNvPr>
-          <p:cNvSpPr>
-            <a:spLocks noGrp="1"/>
-          </p:cNvSpPr>
-          <p:nvPr>
-            <p:ph type="title"/>
-          </p:nvPr>
-        </p:nvSpPr>
-        <p:spPr/>
-        <p:txBody>
-          <a:bodyPr/>
-          <a:lstStyle/>
-          <a:p>
-            <a:r>
-              <a:rPr lang="en-US" dirty="0"/>
-              <a:t>Index</a:t>
-            </a:r>
-            <a:endParaRPr lang="tr-TR" dirty="0"/>
-          </a:p>
-        </p:txBody>
-      </p:sp>
-      <p:sp>
-        <p:nvSpPr>
-          <p:cNvPr id="3" name="Content Placeholder 2">
-            <a:extLst>
-              <a:ext uri="{FF2B5EF4-FFF2-40B4-BE49-F238E27FC236}">
-                <a16:creationId xmlns:a16="http://schemas.microsoft.com/office/drawing/2014/main" id="{64A8D04E-8231-4EB8-8A57-4762885D2BAB}"/>
-              </a:ext>
-            </a:extLst>
-          </p:cNvPr>
-          <p:cNvSpPr>
-            <a:spLocks noGrp="1"/>
-          </p:cNvSpPr>
-          <p:nvPr>
-            <p:ph idx="1"/>
-          </p:nvPr>
-        </p:nvSpPr>
-        <p:spPr/>
-        <p:txBody>
-          <a:bodyPr>
-            <a:normAutofit fontScale="85000" lnSpcReduction="20000"/>
-          </a:bodyPr>
-          <a:lstStyle/>
-          <a:p>
-            <a:r>
-              <a:rPr lang="en-US" dirty="0"/>
-              <a:t>A*</a:t>
-            </a:r>
-          </a:p>
-          <a:p>
-            <a:r>
-              <a:rPr lang="en-US" dirty="0"/>
-              <a:t>CBS (Conflict-based Search)</a:t>
-            </a:r>
-          </a:p>
-          <a:p>
-            <a:pPr lvl="1"/>
-            <a:r>
-              <a:rPr lang="en-US" dirty="0"/>
-              <a:t>High-level</a:t>
-            </a:r>
-          </a:p>
-          <a:p>
-            <a:pPr lvl="1"/>
-            <a:r>
-              <a:rPr lang="en-US" dirty="0"/>
-              <a:t>Low-level</a:t>
-            </a:r>
-          </a:p>
-          <a:p>
-            <a:pPr lvl="1"/>
-            <a:r>
-              <a:rPr lang="en-US" dirty="0"/>
-              <a:t>Comparison of A* and CBS</a:t>
-            </a:r>
-          </a:p>
-          <a:p>
-            <a:pPr lvl="1"/>
-            <a:r>
-              <a:rPr lang="en-US" dirty="0"/>
-              <a:t>Theorical Analysis of CBS</a:t>
-            </a:r>
-          </a:p>
-          <a:p>
-            <a:pPr lvl="1"/>
-            <a:r>
-              <a:rPr lang="en-US" dirty="0"/>
-              <a:t>Experimental results</a:t>
-            </a:r>
-          </a:p>
-          <a:p>
-            <a:r>
-              <a:rPr lang="en-US" dirty="0"/>
-              <a:t>MA-CBS (Meta-agent Conflict-based Search)</a:t>
-            </a:r>
-          </a:p>
-          <a:p>
-            <a:pPr lvl="1"/>
-            <a:r>
-              <a:rPr lang="en-US" dirty="0"/>
-              <a:t>Merge policy</a:t>
-            </a:r>
-          </a:p>
-          <a:p>
-            <a:pPr lvl="1"/>
-            <a:r>
-              <a:rPr lang="en-US" dirty="0"/>
-              <a:t>Merging constraints</a:t>
-            </a:r>
-          </a:p>
-          <a:p>
-            <a:pPr lvl="1"/>
-            <a:r>
-              <a:rPr lang="en-US" dirty="0"/>
-              <a:t>Low-level</a:t>
-            </a:r>
-          </a:p>
-          <a:p>
-            <a:pPr lvl="1"/>
-            <a:r>
-              <a:rPr lang="en-US" dirty="0"/>
-              <a:t>Experimental results</a:t>
-            </a:r>
-          </a:p>
-          <a:p>
-            <a:r>
-              <a:rPr lang="en-US" dirty="0"/>
-              <a:t>References</a:t>
-            </a:r>
-          </a:p>
-          <a:p>
-            <a:pPr lvl="1"/>
-            <a:endParaRPr lang="en-US" dirty="0"/>
-          </a:p>
-          <a:p>
-            <a:pPr lvl="1"/>
-            <a:endParaRPr lang="en-US" dirty="0"/>
-          </a:p>
-          <a:p>
-            <a:pPr lvl="1"/>
-            <a:endParaRPr lang="en-US" dirty="0"/>
-          </a:p>
-          <a:p>
-            <a:pPr lvl="1"/>
-            <a:endParaRPr lang="en-US" dirty="0"/>
-          </a:p>
-          <a:p>
-            <a:endParaRPr lang="tr-TR" dirty="0"/>
-          </a:p>
-        </p:txBody>
-      </p:sp>
-      <p:sp>
-        <p:nvSpPr>
-          <p:cNvPr id="4" name="Slide Number Placeholder 3">
-            <a:extLst>
-              <a:ext uri="{FF2B5EF4-FFF2-40B4-BE49-F238E27FC236}">
-                <a16:creationId xmlns:a16="http://schemas.microsoft.com/office/drawing/2014/main" id="{D300C1ED-E168-4022-B4DB-6C6974A4D5E6}"/>
-              </a:ext>
-            </a:extLst>
-          </p:cNvPr>
-          <p:cNvSpPr>
-            <a:spLocks noGrp="1"/>
-          </p:cNvSpPr>
-          <p:nvPr>
-            <p:ph type="sldNum" sz="quarter" idx="12"/>
-          </p:nvPr>
-        </p:nvSpPr>
-        <p:spPr/>
-        <p:txBody>
-          <a:bodyPr/>
-          <a:lstStyle/>
-          <a:p>
-            <a:fld id="{4B024B25-DFCA-4944-BA90-A17C573440F7}" type="slidenum">
-              <a:rPr lang="tr-TR" smtClean="0"/>
-              <a:t>2</a:t>
-            </a:fld>
-            <a:endParaRPr lang="tr-TR"/>
-          </a:p>
-        </p:txBody>
-      </p:sp>
-    </p:spTree>
-    <p:extLst>
-      <p:ext uri="{BB962C8B-B14F-4D97-AF65-F5344CB8AC3E}">
-        <p14:creationId xmlns:p14="http://schemas.microsoft.com/office/powerpoint/2010/main" val="990298044"/>
-      </p:ext>
-    </p:extLst>
-  </p:cSld>
-  <p:clrMapOvr>
-    <a:masterClrMapping/>
-  </p:clrMapOvr>
-</p:sld>
-</file>
-
-<file path=ppt/slides/slide20.xml><?xml version="1.0" encoding="utf-8"?>
-<p:sld xmlns:a="http://schemas.openxmlformats.org/drawingml/2006/main" xmlns:r="http://schemas.openxmlformats.org/officeDocument/2006/relationships" xmlns:p="http://schemas.openxmlformats.org/presentationml/2006/main">
-  <p:cSld>
-    <p:spTree>
-      <p:nvGrpSpPr>
-        <p:cNvPr id="1" name=""/>
-        <p:cNvGrpSpPr/>
-        <p:nvPr/>
-      </p:nvGrpSpPr>
-      <p:grpSpPr>
-        <a:xfrm>
-          <a:off x="0" y="0"/>
-          <a:ext cx="0" cy="0"/>
-          <a:chOff x="0" y="0"/>
-          <a:chExt cx="0" cy="0"/>
-        </a:xfrm>
-      </p:grpSpPr>
-      <p:sp>
-        <p:nvSpPr>
-          <p:cNvPr id="2" name="Title 1">
-            <a:extLst>
-              <a:ext uri="{FF2B5EF4-FFF2-40B4-BE49-F238E27FC236}">
                 <a16:creationId xmlns:a16="http://schemas.microsoft.com/office/drawing/2014/main" id="{BE9757A8-FD19-4528-9F59-66E5CE8A9B6B}"/>
               </a:ext>
             </a:extLst>
@@ -10287,7 +11376,7 @@
           <a:p>
             <a:fld id="{4B024B25-DFCA-4944-BA90-A17C573440F7}" type="slidenum">
               <a:rPr lang="tr-TR" smtClean="0"/>
-              <a:t>20</a:t>
+              <a:t>22</a:t>
             </a:fld>
             <a:endParaRPr lang="tr-TR"/>
           </a:p>
@@ -10335,7 +11424,7 @@
 </p:sld>
 </file>
 
-<file path=ppt/slides/slide21.xml><?xml version="1.0" encoding="utf-8"?>
+<file path=ppt/slides/slide23.xml><?xml version="1.0" encoding="utf-8"?>
 <p:sld xmlns:a="http://schemas.openxmlformats.org/drawingml/2006/main" xmlns:r="http://schemas.openxmlformats.org/officeDocument/2006/relationships" xmlns:p="http://schemas.openxmlformats.org/presentationml/2006/main">
   <p:cSld>
     <p:spTree>
@@ -10406,7 +11495,7 @@
           <a:p>
             <a:fld id="{4B024B25-DFCA-4944-BA90-A17C573440F7}" type="slidenum">
               <a:rPr lang="tr-TR" smtClean="0"/>
-              <a:t>21</a:t>
+              <a:t>23</a:t>
             </a:fld>
             <a:endParaRPr lang="tr-TR"/>
           </a:p>
@@ -10461,7 +11550,7 @@
 </p:sld>
 </file>
 
-<file path=ppt/slides/slide22.xml><?xml version="1.0" encoding="utf-8"?>
+<file path=ppt/slides/slide24.xml><?xml version="1.0" encoding="utf-8"?>
 <p:sld xmlns:a="http://schemas.openxmlformats.org/drawingml/2006/main" xmlns:r="http://schemas.openxmlformats.org/officeDocument/2006/relationships" xmlns:p="http://schemas.openxmlformats.org/presentationml/2006/main">
   <p:cSld>
     <p:spTree>
@@ -10555,7 +11644,7 @@
           <a:p>
             <a:fld id="{4B024B25-DFCA-4944-BA90-A17C573440F7}" type="slidenum">
               <a:rPr lang="tr-TR" smtClean="0"/>
-              <a:t>22</a:t>
+              <a:t>24</a:t>
             </a:fld>
             <a:endParaRPr lang="tr-TR"/>
           </a:p>
@@ -10604,7 +11693,7 @@
 </p:sld>
 </file>
 
-<file path=ppt/slides/slide23.xml><?xml version="1.0" encoding="utf-8"?>
+<file path=ppt/slides/slide25.xml><?xml version="1.0" encoding="utf-8"?>
 <p:sld xmlns:a="http://schemas.openxmlformats.org/drawingml/2006/main" xmlns:r="http://schemas.openxmlformats.org/officeDocument/2006/relationships" xmlns:p="http://schemas.openxmlformats.org/presentationml/2006/main">
   <p:cSld>
     <p:spTree>
@@ -11177,7 +12266,7 @@
           <a:p>
             <a:fld id="{4B024B25-DFCA-4944-BA90-A17C573440F7}" type="slidenum">
               <a:rPr lang="tr-TR" smtClean="0"/>
-              <a:t>23</a:t>
+              <a:t>25</a:t>
             </a:fld>
             <a:endParaRPr lang="tr-TR"/>
           </a:p>
@@ -11196,7 +12285,7 @@
 </p:sld>
 </file>
 
-<file path=ppt/slides/slide24.xml><?xml version="1.0" encoding="utf-8"?>
+<file path=ppt/slides/slide26.xml><?xml version="1.0" encoding="utf-8"?>
 <p:sld xmlns:a="http://schemas.openxmlformats.org/drawingml/2006/main" xmlns:r="http://schemas.openxmlformats.org/officeDocument/2006/relationships" xmlns:p="http://schemas.openxmlformats.org/presentationml/2006/main">
   <p:cSld>
     <p:spTree>
@@ -11271,7 +12360,7 @@
           <a:p>
             <a:fld id="{4B024B25-DFCA-4944-BA90-A17C573440F7}" type="slidenum">
               <a:rPr lang="tr-TR" smtClean="0"/>
-              <a:t>24</a:t>
+              <a:t>26</a:t>
             </a:fld>
             <a:endParaRPr lang="tr-TR" dirty="0"/>
           </a:p>
@@ -12541,6 +13630,180 @@
           <p:cNvPr id="2" name="Title 1">
             <a:extLst>
               <a:ext uri="{FF2B5EF4-FFF2-40B4-BE49-F238E27FC236}">
+                <a16:creationId xmlns:a16="http://schemas.microsoft.com/office/drawing/2014/main" id="{A5BF6EEC-20EA-41CB-99E2-2531DEC9CD21}"/>
+              </a:ext>
+            </a:extLst>
+          </p:cNvPr>
+          <p:cNvSpPr>
+            <a:spLocks noGrp="1"/>
+          </p:cNvSpPr>
+          <p:nvPr>
+            <p:ph type="title"/>
+          </p:nvPr>
+        </p:nvSpPr>
+        <p:spPr/>
+        <p:txBody>
+          <a:bodyPr/>
+          <a:lstStyle/>
+          <a:p>
+            <a:r>
+              <a:rPr lang="en-US" dirty="0"/>
+              <a:t>Two Level of CBS</a:t>
+            </a:r>
+            <a:endParaRPr lang="tr-TR" dirty="0"/>
+          </a:p>
+        </p:txBody>
+      </p:sp>
+      <p:sp>
+        <p:nvSpPr>
+          <p:cNvPr id="3" name="Content Placeholder 2">
+            <a:extLst>
+              <a:ext uri="{FF2B5EF4-FFF2-40B4-BE49-F238E27FC236}">
+                <a16:creationId xmlns:a16="http://schemas.microsoft.com/office/drawing/2014/main" id="{36F8AAE5-978E-4E04-89FE-85570751A25A}"/>
+              </a:ext>
+            </a:extLst>
+          </p:cNvPr>
+          <p:cNvSpPr>
+            <a:spLocks noGrp="1"/>
+          </p:cNvSpPr>
+          <p:nvPr>
+            <p:ph idx="1"/>
+          </p:nvPr>
+        </p:nvSpPr>
+        <p:spPr/>
+        <p:txBody>
+          <a:bodyPr/>
+          <a:lstStyle/>
+          <a:p>
+            <a:r>
+              <a:rPr lang="en-US" dirty="0"/>
+              <a:t>High level</a:t>
+            </a:r>
+          </a:p>
+          <a:p>
+            <a:pPr lvl="1"/>
+            <a:r>
+              <a:rPr lang="en-US" dirty="0"/>
+              <a:t>Conflict detection</a:t>
+            </a:r>
+          </a:p>
+          <a:p>
+            <a:pPr lvl="1"/>
+            <a:r>
+              <a:rPr lang="en-US" dirty="0"/>
+              <a:t>Constraint management</a:t>
+            </a:r>
+          </a:p>
+          <a:p>
+            <a:r>
+              <a:rPr lang="en-US" dirty="0"/>
+              <a:t>Low level</a:t>
+            </a:r>
+          </a:p>
+          <a:p>
+            <a:pPr lvl="1"/>
+            <a:r>
+              <a:rPr lang="en-US" dirty="0"/>
+              <a:t>Optimal path finding under constraints</a:t>
+            </a:r>
+            <a:endParaRPr lang="tr-TR" dirty="0"/>
+          </a:p>
+        </p:txBody>
+      </p:sp>
+      <p:sp>
+        <p:nvSpPr>
+          <p:cNvPr id="4" name="Slide Number Placeholder 3">
+            <a:extLst>
+              <a:ext uri="{FF2B5EF4-FFF2-40B4-BE49-F238E27FC236}">
+                <a16:creationId xmlns:a16="http://schemas.microsoft.com/office/drawing/2014/main" id="{570826F4-1488-4D5C-8F61-11AD6DED35BC}"/>
+              </a:ext>
+            </a:extLst>
+          </p:cNvPr>
+          <p:cNvSpPr>
+            <a:spLocks noGrp="1"/>
+          </p:cNvSpPr>
+          <p:nvPr>
+            <p:ph type="sldNum" sz="quarter" idx="12"/>
+          </p:nvPr>
+        </p:nvSpPr>
+        <p:spPr/>
+        <p:txBody>
+          <a:bodyPr/>
+          <a:lstStyle/>
+          <a:p>
+            <a:fld id="{4B024B25-DFCA-4944-BA90-A17C573440F7}" type="slidenum">
+              <a:rPr lang="tr-TR" smtClean="0"/>
+              <a:t>6</a:t>
+            </a:fld>
+            <a:endParaRPr lang="tr-TR"/>
+          </a:p>
+        </p:txBody>
+      </p:sp>
+    </p:spTree>
+    <p:extLst>
+      <p:ext uri="{BB962C8B-B14F-4D97-AF65-F5344CB8AC3E}">
+        <p14:creationId xmlns:p14="http://schemas.microsoft.com/office/powerpoint/2010/main" val="2426421004"/>
+      </p:ext>
+    </p:extLst>
+  </p:cSld>
+  <p:clrMapOvr>
+    <a:masterClrMapping/>
+  </p:clrMapOvr>
+</p:sld>
+</file>
+
+<file path=ppt/slides/slide7.xml><?xml version="1.0" encoding="utf-8"?>
+<p:sld xmlns:a="http://schemas.openxmlformats.org/drawingml/2006/main" xmlns:r="http://schemas.openxmlformats.org/officeDocument/2006/relationships" xmlns:p="http://schemas.openxmlformats.org/presentationml/2006/main">
+  <p:cSld>
+    <p:spTree>
+      <p:nvGrpSpPr>
+        <p:cNvPr id="1" name=""/>
+        <p:cNvGrpSpPr/>
+        <p:nvPr/>
+      </p:nvGrpSpPr>
+      <p:grpSpPr>
+        <a:xfrm>
+          <a:off x="0" y="0"/>
+          <a:ext cx="0" cy="0"/>
+          <a:chOff x="0" y="0"/>
+          <a:chExt cx="0" cy="0"/>
+        </a:xfrm>
+      </p:grpSpPr>
+      <p:pic>
+        <p:nvPicPr>
+          <p:cNvPr id="7" name="Picture 6">
+            <a:extLst>
+              <a:ext uri="{FF2B5EF4-FFF2-40B4-BE49-F238E27FC236}">
+                <a16:creationId xmlns:a16="http://schemas.microsoft.com/office/drawing/2014/main" id="{DEEE68FF-2E48-4BEE-ACA9-0CF7B99652D2}"/>
+              </a:ext>
+            </a:extLst>
+          </p:cNvPr>
+          <p:cNvPicPr>
+            <a:picLocks noChangeAspect="1"/>
+          </p:cNvPicPr>
+          <p:nvPr/>
+        </p:nvPicPr>
+        <p:blipFill>
+          <a:blip r:embed="rId3"/>
+          <a:stretch>
+            <a:fillRect/>
+          </a:stretch>
+        </p:blipFill>
+        <p:spPr>
+          <a:xfrm>
+            <a:off x="7605237" y="2395993"/>
+            <a:ext cx="3585601" cy="2732401"/>
+          </a:xfrm>
+          <a:prstGeom prst="rect">
+            <a:avLst/>
+          </a:prstGeom>
+        </p:spPr>
+      </p:pic>
+      <p:sp>
+        <p:nvSpPr>
+          <p:cNvPr id="2" name="Title 1">
+            <a:extLst>
+              <a:ext uri="{FF2B5EF4-FFF2-40B4-BE49-F238E27FC236}">
                 <a16:creationId xmlns:a16="http://schemas.microsoft.com/office/drawing/2014/main" id="{E77A7BCB-50EF-4CE5-AEBC-2A216CA771C1}"/>
               </a:ext>
             </a:extLst>
@@ -12565,8 +13828,8 @@
           </a:p>
         </p:txBody>
       </p:sp>
-      <mc:AlternateContent xmlns:mc="http://schemas.openxmlformats.org/markup-compatibility/2006" xmlns:a14="http://schemas.microsoft.com/office/drawing/2010/main">
-        <mc:Choice Requires="a14">
+      <mc:AlternateContent xmlns:mc="http://schemas.openxmlformats.org/markup-compatibility/2006">
+        <mc:Choice xmlns:a14="http://schemas.microsoft.com/office/drawing/2010/main" Requires="a14">
           <p:sp>
             <p:nvSpPr>
               <p:cNvPr id="3" name="Content Placeholder 2">
@@ -12698,12 +13961,115 @@
                   <a:rPr lang="en-US" dirty="0"/>
                   <a:t>Heuristic function: SIC (Sum of individual costs)</a:t>
                 </a:r>
+              </a:p>
+              <a:p>
+                <a:pPr lvl="1"/>
+                <a:r>
+                  <a:rPr lang="en-US" dirty="0"/>
+                  <a:t>Conflicts denoted by </a:t>
+                </a:r>
+                <a14:m>
+                  <m:oMath xmlns:m="http://schemas.openxmlformats.org/officeDocument/2006/math">
+                    <m:r>
+                      <a:rPr lang="en-US" i="1">
+                        <a:latin typeface="Cambria Math" panose="02040503050406030204" pitchFamily="18" charset="0"/>
+                      </a:rPr>
+                      <m:t>(</m:t>
+                    </m:r>
+                    <m:sSub>
+                      <m:sSubPr>
+                        <m:ctrlPr>
+                          <a:rPr lang="en-US" i="1">
+                            <a:latin typeface="Cambria Math" panose="02040503050406030204" pitchFamily="18" charset="0"/>
+                          </a:rPr>
+                        </m:ctrlPr>
+                      </m:sSubPr>
+                      <m:e>
+                        <m:r>
+                          <a:rPr lang="en-US" i="1">
+                            <a:latin typeface="Cambria Math" panose="02040503050406030204" pitchFamily="18" charset="0"/>
+                          </a:rPr>
+                          <m:t>𝑎</m:t>
+                        </m:r>
+                      </m:e>
+                      <m:sub>
+                        <m:r>
+                          <a:rPr lang="en-US" i="1">
+                            <a:latin typeface="Cambria Math" panose="02040503050406030204" pitchFamily="18" charset="0"/>
+                          </a:rPr>
+                          <m:t>𝑖</m:t>
+                        </m:r>
+                      </m:sub>
+                    </m:sSub>
+                    <m:r>
+                      <a:rPr lang="en-US" i="1">
+                        <a:latin typeface="Cambria Math" panose="02040503050406030204" pitchFamily="18" charset="0"/>
+                      </a:rPr>
+                      <m:t>,</m:t>
+                    </m:r>
+                    <m:sSub>
+                      <m:sSubPr>
+                        <m:ctrlPr>
+                          <a:rPr lang="en-US" b="0" i="1" smtClean="0">
+                            <a:latin typeface="Cambria Math" panose="02040503050406030204" pitchFamily="18" charset="0"/>
+                          </a:rPr>
+                        </m:ctrlPr>
+                      </m:sSubPr>
+                      <m:e>
+                        <m:r>
+                          <a:rPr lang="en-US" b="0" i="1" smtClean="0">
+                            <a:latin typeface="Cambria Math" panose="02040503050406030204" pitchFamily="18" charset="0"/>
+                          </a:rPr>
+                          <m:t>𝑎</m:t>
+                        </m:r>
+                      </m:e>
+                      <m:sub>
+                        <m:r>
+                          <a:rPr lang="en-US" b="0" i="1" smtClean="0">
+                            <a:latin typeface="Cambria Math" panose="02040503050406030204" pitchFamily="18" charset="0"/>
+                          </a:rPr>
+                          <m:t>𝑗</m:t>
+                        </m:r>
+                      </m:sub>
+                    </m:sSub>
+                    <m:r>
+                      <a:rPr lang="en-US" i="1">
+                        <a:latin typeface="Cambria Math" panose="02040503050406030204" pitchFamily="18" charset="0"/>
+                      </a:rPr>
+                      <m:t>,</m:t>
+                    </m:r>
+                    <m:r>
+                      <a:rPr lang="en-US" b="0" i="1" smtClean="0">
+                        <a:latin typeface="Cambria Math" panose="02040503050406030204" pitchFamily="18" charset="0"/>
+                      </a:rPr>
+                      <m:t>𝑣</m:t>
+                    </m:r>
+                    <m:r>
+                      <a:rPr lang="en-US" i="1">
+                        <a:latin typeface="Cambria Math" panose="02040503050406030204" pitchFamily="18" charset="0"/>
+                      </a:rPr>
+                      <m:t>,</m:t>
+                    </m:r>
+                    <m:r>
+                      <a:rPr lang="en-US" i="1">
+                        <a:latin typeface="Cambria Math" panose="02040503050406030204" pitchFamily="18" charset="0"/>
+                      </a:rPr>
+                      <m:t>𝑡</m:t>
+                    </m:r>
+                    <m:r>
+                      <a:rPr lang="en-US" i="1">
+                        <a:latin typeface="Cambria Math" panose="02040503050406030204" pitchFamily="18" charset="0"/>
+                      </a:rPr>
+                      <m:t>)</m:t>
+                    </m:r>
+                  </m:oMath>
+                </a14:m>
                 <a:endParaRPr lang="tr-TR" dirty="0"/>
               </a:p>
             </p:txBody>
           </p:sp>
         </mc:Choice>
-        <mc:Fallback xmlns="">
+        <mc:Fallback>
           <p:sp>
             <p:nvSpPr>
               <p:cNvPr id="3" name="Content Placeholder 2">
@@ -12722,7 +14088,7 @@
             </p:nvSpPr>
             <p:spPr>
               <a:blipFill>
-                <a:blip r:embed="rId3"/>
+                <a:blip r:embed="rId4"/>
                 <a:stretch>
                   <a:fillRect l="-1043" t="-2241"/>
                 </a:stretch>
@@ -12743,36 +14109,6 @@
           </p:sp>
         </mc:Fallback>
       </mc:AlternateContent>
-      <p:pic>
-        <p:nvPicPr>
-          <p:cNvPr id="6" name="Picture 5">
-            <a:extLst>
-              <a:ext uri="{FF2B5EF4-FFF2-40B4-BE49-F238E27FC236}">
-                <a16:creationId xmlns:a16="http://schemas.microsoft.com/office/drawing/2014/main" id="{FB8DF72B-438A-4F17-8202-6B992E31CD2E}"/>
-              </a:ext>
-            </a:extLst>
-          </p:cNvPr>
-          <p:cNvPicPr>
-            <a:picLocks noChangeAspect="1"/>
-          </p:cNvPicPr>
-          <p:nvPr/>
-        </p:nvPicPr>
-        <p:blipFill>
-          <a:blip r:embed="rId4"/>
-          <a:stretch>
-            <a:fillRect/>
-          </a:stretch>
-        </p:blipFill>
-        <p:spPr>
-          <a:xfrm>
-            <a:off x="6469226" y="2896240"/>
-            <a:ext cx="2210108" cy="1105054"/>
-          </a:xfrm>
-          <a:prstGeom prst="rect">
-            <a:avLst/>
-          </a:prstGeom>
-        </p:spPr>
-      </p:pic>
       <p:sp>
         <p:nvSpPr>
           <p:cNvPr id="4" name="Slide Number Placeholder 3">
@@ -12796,7 +14132,7 @@
           <a:p>
             <a:fld id="{4B024B25-DFCA-4944-BA90-A17C573440F7}" type="slidenum">
               <a:rPr lang="tr-TR" smtClean="0"/>
-              <a:t>6</a:t>
+              <a:t>7</a:t>
             </a:fld>
             <a:endParaRPr lang="tr-TR"/>
           </a:p>
@@ -12815,7 +14151,7 @@
 </p:sld>
 </file>
 
-<file path=ppt/slides/slide7.xml><?xml version="1.0" encoding="utf-8"?>
+<file path=ppt/slides/slide8.xml><?xml version="1.0" encoding="utf-8"?>
 <p:sld xmlns:a="http://schemas.openxmlformats.org/drawingml/2006/main" xmlns:r="http://schemas.openxmlformats.org/officeDocument/2006/relationships" xmlns:p="http://schemas.openxmlformats.org/presentationml/2006/main">
   <p:cSld>
     <p:spTree>
@@ -13023,7 +14359,7 @@
           <a:p>
             <a:fld id="{4B024B25-DFCA-4944-BA90-A17C573440F7}" type="slidenum">
               <a:rPr lang="tr-TR" smtClean="0"/>
-              <a:t>7</a:t>
+              <a:t>8</a:t>
             </a:fld>
             <a:endParaRPr lang="tr-TR"/>
           </a:p>
@@ -13218,7 +14554,7 @@
 </p:sld>
 </file>
 
-<file path=ppt/slides/slide8.xml><?xml version="1.0" encoding="utf-8"?>
+<file path=ppt/slides/slide9.xml><?xml version="1.0" encoding="utf-8"?>
 <p:sld xmlns:a="http://schemas.openxmlformats.org/drawingml/2006/main" xmlns:r="http://schemas.openxmlformats.org/officeDocument/2006/relationships" xmlns:p="http://schemas.openxmlformats.org/presentationml/2006/main">
   <p:cSld>
     <p:spTree>
@@ -13418,7 +14754,7 @@
           <a:p>
             <a:fld id="{4B024B25-DFCA-4944-BA90-A17C573440F7}" type="slidenum">
               <a:rPr lang="tr-TR" smtClean="0"/>
-              <a:t>8</a:t>
+              <a:t>9</a:t>
             </a:fld>
             <a:endParaRPr lang="tr-TR"/>
           </a:p>
@@ -13428,542 +14764,6 @@
     <p:extLst>
       <p:ext uri="{BB962C8B-B14F-4D97-AF65-F5344CB8AC3E}">
         <p14:creationId xmlns:p14="http://schemas.microsoft.com/office/powerpoint/2010/main" val="1782670633"/>
-      </p:ext>
-    </p:extLst>
-  </p:cSld>
-  <p:clrMapOvr>
-    <a:masterClrMapping/>
-  </p:clrMapOvr>
-</p:sld>
-</file>
-
-<file path=ppt/slides/slide9.xml><?xml version="1.0" encoding="utf-8"?>
-<p:sld xmlns:a="http://schemas.openxmlformats.org/drawingml/2006/main" xmlns:r="http://schemas.openxmlformats.org/officeDocument/2006/relationships" xmlns:p="http://schemas.openxmlformats.org/presentationml/2006/main">
-  <p:cSld>
-    <p:spTree>
-      <p:nvGrpSpPr>
-        <p:cNvPr id="1" name=""/>
-        <p:cNvGrpSpPr/>
-        <p:nvPr/>
-      </p:nvGrpSpPr>
-      <p:grpSpPr>
-        <a:xfrm>
-          <a:off x="0" y="0"/>
-          <a:ext cx="0" cy="0"/>
-          <a:chOff x="0" y="0"/>
-          <a:chExt cx="0" cy="0"/>
-        </a:xfrm>
-      </p:grpSpPr>
-      <p:sp>
-        <p:nvSpPr>
-          <p:cNvPr id="2" name="Title 1">
-            <a:extLst>
-              <a:ext uri="{FF2B5EF4-FFF2-40B4-BE49-F238E27FC236}">
-                <a16:creationId xmlns:a16="http://schemas.microsoft.com/office/drawing/2014/main" id="{9AAFC9F0-A61F-45D3-A9A1-EEBCCC05DC35}"/>
-              </a:ext>
-            </a:extLst>
-          </p:cNvPr>
-          <p:cNvSpPr>
-            <a:spLocks noGrp="1"/>
-          </p:cNvSpPr>
-          <p:nvPr>
-            <p:ph type="title"/>
-          </p:nvPr>
-        </p:nvSpPr>
-        <p:spPr/>
-        <p:txBody>
-          <a:bodyPr/>
-          <a:lstStyle/>
-          <a:p>
-            <a:r>
-              <a:rPr lang="en-US" dirty="0"/>
-              <a:t>CBS</a:t>
-            </a:r>
-            <a:endParaRPr lang="tr-TR" dirty="0"/>
-          </a:p>
-        </p:txBody>
-      </p:sp>
-      <mc:AlternateContent xmlns:mc="http://schemas.openxmlformats.org/markup-compatibility/2006" xmlns:a14="http://schemas.microsoft.com/office/drawing/2010/main">
-        <mc:Choice Requires="a14">
-          <p:sp>
-            <p:nvSpPr>
-              <p:cNvPr id="3" name="Content Placeholder 2">
-                <a:extLst>
-                  <a:ext uri="{FF2B5EF4-FFF2-40B4-BE49-F238E27FC236}">
-                    <a16:creationId xmlns:a16="http://schemas.microsoft.com/office/drawing/2014/main" id="{D54AD1DD-94E1-4010-805C-B6DD763D30CF}"/>
-                  </a:ext>
-                </a:extLst>
-              </p:cNvPr>
-              <p:cNvSpPr>
-                <a:spLocks noGrp="1"/>
-              </p:cNvSpPr>
-              <p:nvPr>
-                <p:ph idx="1"/>
-              </p:nvPr>
-            </p:nvSpPr>
-            <p:spPr/>
-            <p:txBody>
-              <a:bodyPr/>
-              <a:lstStyle/>
-              <a:p>
-                <a:r>
-                  <a:rPr lang="en-US" dirty="0"/>
-                  <a:t>Edge conflict:</a:t>
-                </a:r>
-              </a:p>
-              <a:p>
-                <a14:m>
-                  <m:oMath xmlns:m="http://schemas.openxmlformats.org/officeDocument/2006/math">
-                    <m:r>
-                      <a:rPr lang="en-US" sz="2000" i="1">
-                        <a:latin typeface="Cambria Math" panose="02040503050406030204" pitchFamily="18" charset="0"/>
-                      </a:rPr>
-                      <m:t>(</m:t>
-                    </m:r>
-                    <m:sSub>
-                      <m:sSubPr>
-                        <m:ctrlPr>
-                          <a:rPr lang="en-US" sz="2000" b="0" i="1" smtClean="0">
-                            <a:latin typeface="Cambria Math" panose="02040503050406030204" pitchFamily="18" charset="0"/>
-                          </a:rPr>
-                        </m:ctrlPr>
-                      </m:sSubPr>
-                      <m:e>
-                        <m:r>
-                          <a:rPr lang="en-US" sz="2000" b="0" i="1" smtClean="0">
-                            <a:latin typeface="Cambria Math" panose="02040503050406030204" pitchFamily="18" charset="0"/>
-                          </a:rPr>
-                          <m:t>𝑎</m:t>
-                        </m:r>
-                      </m:e>
-                      <m:sub>
-                        <m:r>
-                          <a:rPr lang="en-US" sz="2000" b="0" i="1" smtClean="0">
-                            <a:latin typeface="Cambria Math" panose="02040503050406030204" pitchFamily="18" charset="0"/>
-                          </a:rPr>
-                          <m:t>𝑖</m:t>
-                        </m:r>
-                      </m:sub>
-                    </m:sSub>
-                    <m:r>
-                      <a:rPr lang="en-US" sz="2000" i="1">
-                        <a:latin typeface="Cambria Math" panose="02040503050406030204" pitchFamily="18" charset="0"/>
-                      </a:rPr>
-                      <m:t>,</m:t>
-                    </m:r>
-                    <m:sSub>
-                      <m:sSubPr>
-                        <m:ctrlPr>
-                          <a:rPr lang="en-US" sz="2000" i="1">
-                            <a:latin typeface="Cambria Math" panose="02040503050406030204" pitchFamily="18" charset="0"/>
-                          </a:rPr>
-                        </m:ctrlPr>
-                      </m:sSubPr>
-                      <m:e>
-                        <m:r>
-                          <a:rPr lang="en-US" sz="2000" i="1">
-                            <a:latin typeface="Cambria Math" panose="02040503050406030204" pitchFamily="18" charset="0"/>
-                          </a:rPr>
-                          <m:t>𝑣</m:t>
-                        </m:r>
-                      </m:e>
-                      <m:sub>
-                        <m:r>
-                          <a:rPr lang="en-US" sz="2000" b="0" i="1" smtClean="0">
-                            <a:latin typeface="Cambria Math" panose="02040503050406030204" pitchFamily="18" charset="0"/>
-                          </a:rPr>
-                          <m:t>1</m:t>
-                        </m:r>
-                      </m:sub>
-                    </m:sSub>
-                    <m:r>
-                      <a:rPr lang="en-US" sz="2000" i="1">
-                        <a:latin typeface="Cambria Math" panose="02040503050406030204" pitchFamily="18" charset="0"/>
-                      </a:rPr>
-                      <m:t>, </m:t>
-                    </m:r>
-                    <m:sSub>
-                      <m:sSubPr>
-                        <m:ctrlPr>
-                          <a:rPr lang="en-US" sz="2000" i="1">
-                            <a:latin typeface="Cambria Math" panose="02040503050406030204" pitchFamily="18" charset="0"/>
-                          </a:rPr>
-                        </m:ctrlPr>
-                      </m:sSubPr>
-                      <m:e>
-                        <m:r>
-                          <a:rPr lang="en-US" sz="2000" i="1">
-                            <a:latin typeface="Cambria Math" panose="02040503050406030204" pitchFamily="18" charset="0"/>
-                          </a:rPr>
-                          <m:t>𝑣</m:t>
-                        </m:r>
-                      </m:e>
-                      <m:sub>
-                        <m:r>
-                          <a:rPr lang="en-US" sz="2000" i="1">
-                            <a:latin typeface="Cambria Math" panose="02040503050406030204" pitchFamily="18" charset="0"/>
-                          </a:rPr>
-                          <m:t>2</m:t>
-                        </m:r>
-                      </m:sub>
-                    </m:sSub>
-                    <m:r>
-                      <a:rPr lang="en-US" sz="2000" i="1">
-                        <a:latin typeface="Cambria Math" panose="02040503050406030204" pitchFamily="18" charset="0"/>
-                      </a:rPr>
-                      <m:t>,</m:t>
-                    </m:r>
-                    <m:r>
-                      <a:rPr lang="en-US" sz="2000" b="0" i="1" smtClean="0">
-                        <a:latin typeface="Cambria Math" panose="02040503050406030204" pitchFamily="18" charset="0"/>
-                      </a:rPr>
-                      <m:t>𝑡</m:t>
-                    </m:r>
-                    <m:r>
-                      <a:rPr lang="en-US" sz="2000" i="1">
-                        <a:latin typeface="Cambria Math" panose="02040503050406030204" pitchFamily="18" charset="0"/>
-                      </a:rPr>
-                      <m:t>)</m:t>
-                    </m:r>
-                  </m:oMath>
-                </a14:m>
-                <a:endParaRPr lang="en-US" sz="2000" dirty="0"/>
-              </a:p>
-              <a:p>
-                <a:endParaRPr lang="en-US" dirty="0"/>
-              </a:p>
-              <a:p>
-                <a:endParaRPr lang="en-US" dirty="0"/>
-              </a:p>
-              <a:p>
-                <a:pPr marL="3200400" lvl="7" indent="0">
-                  <a:buNone/>
-                </a:pPr>
-                <a:r>
-                  <a:rPr lang="en-US" dirty="0"/>
-                  <a:t>			 </a:t>
-                </a:r>
-                <a:endParaRPr lang="tr-TR" dirty="0"/>
-              </a:p>
-            </p:txBody>
-          </p:sp>
-        </mc:Choice>
-        <mc:Fallback xmlns="">
-          <p:sp>
-            <p:nvSpPr>
-              <p:cNvPr id="3" name="Content Placeholder 2">
-                <a:extLst>
-                  <a:ext uri="{FF2B5EF4-FFF2-40B4-BE49-F238E27FC236}">
-                    <a16:creationId xmlns:a16="http://schemas.microsoft.com/office/drawing/2014/main" id="{D54AD1DD-94E1-4010-805C-B6DD763D30CF}"/>
-                  </a:ext>
-                </a:extLst>
-              </p:cNvPr>
-              <p:cNvSpPr>
-                <a:spLocks noGrp="1" noRot="1" noChangeAspect="1" noMove="1" noResize="1" noEditPoints="1" noAdjustHandles="1" noChangeArrowheads="1" noChangeShapeType="1" noTextEdit="1"/>
-              </p:cNvSpPr>
-              <p:nvPr>
-                <p:ph idx="1"/>
-              </p:nvPr>
-            </p:nvSpPr>
-            <p:spPr>
-              <a:blipFill>
-                <a:blip r:embed="rId3"/>
-                <a:stretch>
-                  <a:fillRect l="-1043" t="-2241"/>
-                </a:stretch>
-              </a:blipFill>
-            </p:spPr>
-            <p:txBody>
-              <a:bodyPr/>
-              <a:lstStyle/>
-              <a:p>
-                <a:r>
-                  <a:rPr lang="tr-TR">
-                    <a:noFill/>
-                  </a:rPr>
-                  <a:t> </a:t>
-                </a:r>
-              </a:p>
-            </p:txBody>
-          </p:sp>
-        </mc:Fallback>
-      </mc:AlternateContent>
-      <p:grpSp>
-        <p:nvGrpSpPr>
-          <p:cNvPr id="6" name="Group 5">
-            <a:extLst>
-              <a:ext uri="{FF2B5EF4-FFF2-40B4-BE49-F238E27FC236}">
-                <a16:creationId xmlns:a16="http://schemas.microsoft.com/office/drawing/2014/main" id="{9B88EE3C-8C96-49B1-ACF2-31E5FEA9783C}"/>
-              </a:ext>
-            </a:extLst>
-          </p:cNvPr>
-          <p:cNvGrpSpPr/>
-          <p:nvPr/>
-        </p:nvGrpSpPr>
-        <p:grpSpPr>
-          <a:xfrm>
-            <a:off x="3273519" y="1632427"/>
-            <a:ext cx="3561621" cy="1635184"/>
-            <a:chOff x="3403059" y="2539207"/>
-            <a:chExt cx="3561621" cy="1635184"/>
-          </a:xfrm>
-        </p:grpSpPr>
-        <p:pic>
-          <p:nvPicPr>
-            <p:cNvPr id="4" name="Picture 3">
-              <a:extLst>
-                <a:ext uri="{FF2B5EF4-FFF2-40B4-BE49-F238E27FC236}">
-                  <a16:creationId xmlns:a16="http://schemas.microsoft.com/office/drawing/2014/main" id="{2B170F7F-4B23-4BA6-A753-3D0BF8D59A91}"/>
-                </a:ext>
-              </a:extLst>
-            </p:cNvPr>
-            <p:cNvPicPr>
-              <a:picLocks noChangeAspect="1"/>
-            </p:cNvPicPr>
-            <p:nvPr/>
-          </p:nvPicPr>
-          <p:blipFill>
-            <a:blip r:embed="rId4"/>
-            <a:stretch>
-              <a:fillRect/>
-            </a:stretch>
-          </p:blipFill>
-          <p:spPr>
-            <a:xfrm>
-              <a:off x="3403059" y="2539207"/>
-              <a:ext cx="3561621" cy="1116330"/>
-            </a:xfrm>
-            <a:prstGeom prst="rect">
-              <a:avLst/>
-            </a:prstGeom>
-          </p:spPr>
-        </p:pic>
-        <mc:AlternateContent xmlns:mc="http://schemas.openxmlformats.org/markup-compatibility/2006" xmlns:a14="http://schemas.microsoft.com/office/drawing/2010/main">
-          <mc:Choice Requires="a14">
-            <p:sp>
-              <p:nvSpPr>
-                <p:cNvPr id="5" name="TextBox 4">
-                  <a:extLst>
-                    <a:ext uri="{FF2B5EF4-FFF2-40B4-BE49-F238E27FC236}">
-                      <a16:creationId xmlns:a16="http://schemas.microsoft.com/office/drawing/2014/main" id="{18D351A8-3462-48CE-90A5-44F023917A6D}"/>
-                    </a:ext>
-                  </a:extLst>
-                </p:cNvPr>
-                <p:cNvSpPr txBox="1"/>
-                <p:nvPr/>
-              </p:nvSpPr>
-              <p:spPr>
-                <a:xfrm>
-                  <a:off x="4450081" y="3528060"/>
-                  <a:ext cx="1577340" cy="646331"/>
-                </a:xfrm>
-                <a:prstGeom prst="rect">
-                  <a:avLst/>
-                </a:prstGeom>
-                <a:noFill/>
-              </p:spPr>
-              <p:txBody>
-                <a:bodyPr wrap="square" rtlCol="0">
-                  <a:spAutoFit/>
-                </a:bodyPr>
-                <a:lstStyle/>
-                <a:p>
-                  <a:pPr/>
-                  <a14:m>
-                    <m:oMathPara xmlns:m="http://schemas.openxmlformats.org/officeDocument/2006/math">
-                      <m:oMathParaPr>
-                        <m:jc m:val="centerGroup"/>
-                      </m:oMathParaPr>
-                      <m:oMath xmlns:m="http://schemas.openxmlformats.org/officeDocument/2006/math">
-                        <m:r>
-                          <a:rPr lang="en-US" i="1">
-                            <a:latin typeface="Cambria Math" panose="02040503050406030204" pitchFamily="18" charset="0"/>
-                          </a:rPr>
-                          <m:t>(</m:t>
-                        </m:r>
-                        <m:sSub>
-                          <m:sSubPr>
-                            <m:ctrlPr>
-                              <a:rPr lang="en-US" i="1">
-                                <a:latin typeface="Cambria Math" panose="02040503050406030204" pitchFamily="18" charset="0"/>
-                              </a:rPr>
-                            </m:ctrlPr>
-                          </m:sSubPr>
-                          <m:e>
-                            <m:r>
-                              <a:rPr lang="en-US" i="1">
-                                <a:latin typeface="Cambria Math" panose="02040503050406030204" pitchFamily="18" charset="0"/>
-                              </a:rPr>
-                              <m:t>𝑎</m:t>
-                            </m:r>
-                          </m:e>
-                          <m:sub>
-                            <m:r>
-                              <a:rPr lang="en-US" i="1">
-                                <a:latin typeface="Cambria Math" panose="02040503050406030204" pitchFamily="18" charset="0"/>
-                              </a:rPr>
-                              <m:t>1</m:t>
-                            </m:r>
-                          </m:sub>
-                        </m:sSub>
-                        <m:r>
-                          <a:rPr lang="en-US" i="1">
-                            <a:latin typeface="Cambria Math" panose="02040503050406030204" pitchFamily="18" charset="0"/>
-                          </a:rPr>
-                          <m:t>,</m:t>
-                        </m:r>
-                        <m:sSub>
-                          <m:sSubPr>
-                            <m:ctrlPr>
-                              <a:rPr lang="en-US" i="1">
-                                <a:latin typeface="Cambria Math" panose="02040503050406030204" pitchFamily="18" charset="0"/>
-                              </a:rPr>
-                            </m:ctrlPr>
-                          </m:sSubPr>
-                          <m:e>
-                            <m:r>
-                              <a:rPr lang="en-US" i="1">
-                                <a:latin typeface="Cambria Math" panose="02040503050406030204" pitchFamily="18" charset="0"/>
-                              </a:rPr>
-                              <m:t>𝑣</m:t>
-                            </m:r>
-                          </m:e>
-                          <m:sub>
-                            <m:r>
-                              <a:rPr lang="en-US" i="1">
-                                <a:latin typeface="Cambria Math" panose="02040503050406030204" pitchFamily="18" charset="0"/>
-                              </a:rPr>
-                              <m:t>1</m:t>
-                            </m:r>
-                          </m:sub>
-                        </m:sSub>
-                        <m:r>
-                          <a:rPr lang="en-US" i="1">
-                            <a:latin typeface="Cambria Math" panose="02040503050406030204" pitchFamily="18" charset="0"/>
-                          </a:rPr>
-                          <m:t>, </m:t>
-                        </m:r>
-                        <m:sSub>
-                          <m:sSubPr>
-                            <m:ctrlPr>
-                              <a:rPr lang="en-US" i="1">
-                                <a:latin typeface="Cambria Math" panose="02040503050406030204" pitchFamily="18" charset="0"/>
-                              </a:rPr>
-                            </m:ctrlPr>
-                          </m:sSubPr>
-                          <m:e>
-                            <m:r>
-                              <a:rPr lang="en-US" i="1">
-                                <a:latin typeface="Cambria Math" panose="02040503050406030204" pitchFamily="18" charset="0"/>
-                              </a:rPr>
-                              <m:t>𝑣</m:t>
-                            </m:r>
-                          </m:e>
-                          <m:sub>
-                            <m:r>
-                              <a:rPr lang="en-US" i="1">
-                                <a:latin typeface="Cambria Math" panose="02040503050406030204" pitchFamily="18" charset="0"/>
-                              </a:rPr>
-                              <m:t>2</m:t>
-                            </m:r>
-                          </m:sub>
-                        </m:sSub>
-                        <m:r>
-                          <a:rPr lang="en-US" i="1">
-                            <a:latin typeface="Cambria Math" panose="02040503050406030204" pitchFamily="18" charset="0"/>
-                          </a:rPr>
-                          <m:t>,0)</m:t>
-                        </m:r>
-                      </m:oMath>
-                    </m:oMathPara>
-                  </a14:m>
-                  <a:endParaRPr lang="en-US" dirty="0"/>
-                </a:p>
-                <a:p>
-                  <a:endParaRPr lang="tr-TR" dirty="0"/>
-                </a:p>
-              </p:txBody>
-            </p:sp>
-          </mc:Choice>
-          <mc:Fallback xmlns="">
-            <p:sp>
-              <p:nvSpPr>
-                <p:cNvPr id="5" name="TextBox 4">
-                  <a:extLst>
-                    <a:ext uri="{FF2B5EF4-FFF2-40B4-BE49-F238E27FC236}">
-                      <a16:creationId xmlns:a16="http://schemas.microsoft.com/office/drawing/2014/main" id="{18D351A8-3462-48CE-90A5-44F023917A6D}"/>
-                    </a:ext>
-                  </a:extLst>
-                </p:cNvPr>
-                <p:cNvSpPr txBox="1">
-                  <a:spLocks noRot="1" noChangeAspect="1" noMove="1" noResize="1" noEditPoints="1" noAdjustHandles="1" noChangeArrowheads="1" noChangeShapeType="1" noTextEdit="1"/>
-                </p:cNvSpPr>
-                <p:nvPr/>
-              </p:nvSpPr>
-              <p:spPr>
-                <a:xfrm>
-                  <a:off x="4450081" y="3528060"/>
-                  <a:ext cx="1577340" cy="646331"/>
-                </a:xfrm>
-                <a:prstGeom prst="rect">
-                  <a:avLst/>
-                </a:prstGeom>
-                <a:blipFill>
-                  <a:blip r:embed="rId5"/>
-                  <a:stretch>
-                    <a:fillRect/>
-                  </a:stretch>
-                </a:blipFill>
-              </p:spPr>
-              <p:txBody>
-                <a:bodyPr/>
-                <a:lstStyle/>
-                <a:p>
-                  <a:r>
-                    <a:rPr lang="tr-TR">
-                      <a:noFill/>
-                    </a:rPr>
-                    <a:t> </a:t>
-                  </a:r>
-                </a:p>
-              </p:txBody>
-            </p:sp>
-          </mc:Fallback>
-        </mc:AlternateContent>
-      </p:grpSp>
-      <p:sp>
-        <p:nvSpPr>
-          <p:cNvPr id="7" name="Slide Number Placeholder 6">
-            <a:extLst>
-              <a:ext uri="{FF2B5EF4-FFF2-40B4-BE49-F238E27FC236}">
-                <a16:creationId xmlns:a16="http://schemas.microsoft.com/office/drawing/2014/main" id="{826C51A9-6596-44FC-BAFC-03CF101E11C0}"/>
-              </a:ext>
-            </a:extLst>
-          </p:cNvPr>
-          <p:cNvSpPr>
-            <a:spLocks noGrp="1"/>
-          </p:cNvSpPr>
-          <p:nvPr>
-            <p:ph type="sldNum" sz="quarter" idx="12"/>
-          </p:nvPr>
-        </p:nvSpPr>
-        <p:spPr/>
-        <p:txBody>
-          <a:bodyPr/>
-          <a:lstStyle/>
-          <a:p>
-            <a:fld id="{4B024B25-DFCA-4944-BA90-A17C573440F7}" type="slidenum">
-              <a:rPr lang="tr-TR" smtClean="0"/>
-              <a:t>9</a:t>
-            </a:fld>
-            <a:endParaRPr lang="tr-TR"/>
-          </a:p>
-        </p:txBody>
-      </p:sp>
-    </p:spTree>
-    <p:extLst>
-      <p:ext uri="{BB962C8B-B14F-4D97-AF65-F5344CB8AC3E}">
-        <p14:creationId xmlns:p14="http://schemas.microsoft.com/office/powerpoint/2010/main" val="1177107809"/>
       </p:ext>
     </p:extLst>
   </p:cSld>
@@ -14118,6 +14918,22 @@
 </file>
 
 <file path=ppt/tags/tag26.xml><?xml version="1.0" encoding="utf-8"?>
+<p:tagLst xmlns:a="http://schemas.openxmlformats.org/drawingml/2006/main" xmlns:r="http://schemas.openxmlformats.org/officeDocument/2006/relationships" xmlns:p="http://schemas.openxmlformats.org/presentationml/2006/main">
+  <p:tag name="BJHEADERFOOTERLABEL" val="TRUE"/>
+  <p:tag name="BJHEADERFOOTERTEXTLABEL" val="TASNİF DIŞI"/>
+  <p:tag name="BJHEADERFOOTERTEXTMARKING" val="TASNİF DIŞI"/>
+</p:tagLst>
+</file>
+
+<file path=ppt/tags/tag27.xml><?xml version="1.0" encoding="utf-8"?>
+<p:tagLst xmlns:a="http://schemas.openxmlformats.org/drawingml/2006/main" xmlns:r="http://schemas.openxmlformats.org/officeDocument/2006/relationships" xmlns:p="http://schemas.openxmlformats.org/presentationml/2006/main">
+  <p:tag name="BJHEADERFOOTERLABEL" val="TRUE"/>
+  <p:tag name="BJHEADERFOOTERTEXTLABEL" val="TASNİF DIŞI"/>
+  <p:tag name="BJHEADERFOOTERTEXTMARKING" val="TASNİF DIŞI"/>
+</p:tagLst>
+</file>
+
+<file path=ppt/tags/tag28.xml><?xml version="1.0" encoding="utf-8"?>
 <p:tagLst xmlns:a="http://schemas.openxmlformats.org/drawingml/2006/main" xmlns:r="http://schemas.openxmlformats.org/officeDocument/2006/relationships" xmlns:p="http://schemas.openxmlformats.org/presentationml/2006/main">
   <p:tag name="BJHEADERFOOTERLABEL" val="TRUE"/>
   <p:tag name="BJHEADERFOOTERTEXTLABEL" val="TASNİF DIŞI"/>
@@ -15073,7 +15889,7 @@
 </file>
 
 <file path=customXml/itemProps1.xml><?xml version="1.0" encoding="utf-8"?>
-<ds:datastoreItem xmlns:ds="http://schemas.openxmlformats.org/officeDocument/2006/customXml" ds:itemID="{7107ED66-91FF-4AD6-9427-5FCC29F102D3}">
+<ds:datastoreItem xmlns:ds="http://schemas.openxmlformats.org/officeDocument/2006/customXml" ds:itemID="{3D1817F0-3AED-4497-977A-6BC73993470D}">
   <ds:schemaRefs>
     <ds:schemaRef ds:uri="http://www.w3.org/2001/XMLSchema"/>
     <ds:schemaRef ds:uri="http://www.boldonjames.com/2008/01/sie/internal/label"/>

</xml_diff>